<commit_message>
PPT + Finishing Memoria
</commit_message>
<xml_diff>
--- a/Memoria_pres.pptx
+++ b/Memoria_pres.pptx
@@ -13,7 +13,11 @@
     <p:sldId id="275" r:id="rId7"/>
     <p:sldId id="281" r:id="rId8"/>
     <p:sldId id="282" r:id="rId9"/>
-    <p:sldId id="273" r:id="rId10"/>
+    <p:sldId id="283" r:id="rId10"/>
+    <p:sldId id="284" r:id="rId11"/>
+    <p:sldId id="285" r:id="rId12"/>
+    <p:sldId id="286" r:id="rId13"/>
+    <p:sldId id="273" r:id="rId14"/>
   </p:sldIdLst>
   <p:sldSz cx="12192000" cy="6858000"/>
   <p:notesSz cx="6858000" cy="9144000"/>
@@ -125,6 +129,10 @@
             <p14:sldId id="275"/>
             <p14:sldId id="281"/>
             <p14:sldId id="282"/>
+            <p14:sldId id="283"/>
+            <p14:sldId id="284"/>
+            <p14:sldId id="285"/>
+            <p14:sldId id="286"/>
             <p14:sldId id="273"/>
           </p14:sldIdLst>
         </p14:section>
@@ -286,7 +294,7 @@
           <a:p>
             <a:fld id="{73A294DA-5B1F-406C-B1D4-C938C7055EF9}" type="datetimeFigureOut">
               <a:rPr lang="es-ES" smtClean="0"/>
-              <a:t>05/01/2023</a:t>
+              <a:t>06/01/2023</a:t>
             </a:fld>
             <a:endParaRPr lang="es-ES"/>
           </a:p>
@@ -486,7 +494,7 @@
           <a:p>
             <a:fld id="{73A294DA-5B1F-406C-B1D4-C938C7055EF9}" type="datetimeFigureOut">
               <a:rPr lang="es-ES" smtClean="0"/>
-              <a:t>05/01/2023</a:t>
+              <a:t>06/01/2023</a:t>
             </a:fld>
             <a:endParaRPr lang="es-ES"/>
           </a:p>
@@ -696,7 +704,7 @@
           <a:p>
             <a:fld id="{73A294DA-5B1F-406C-B1D4-C938C7055EF9}" type="datetimeFigureOut">
               <a:rPr lang="es-ES" smtClean="0"/>
-              <a:t>05/01/2023</a:t>
+              <a:t>06/01/2023</a:t>
             </a:fld>
             <a:endParaRPr lang="es-ES"/>
           </a:p>
@@ -896,7 +904,7 @@
           <a:p>
             <a:fld id="{73A294DA-5B1F-406C-B1D4-C938C7055EF9}" type="datetimeFigureOut">
               <a:rPr lang="es-ES" smtClean="0"/>
-              <a:t>05/01/2023</a:t>
+              <a:t>06/01/2023</a:t>
             </a:fld>
             <a:endParaRPr lang="es-ES"/>
           </a:p>
@@ -1172,7 +1180,7 @@
           <a:p>
             <a:fld id="{73A294DA-5B1F-406C-B1D4-C938C7055EF9}" type="datetimeFigureOut">
               <a:rPr lang="es-ES" smtClean="0"/>
-              <a:t>05/01/2023</a:t>
+              <a:t>06/01/2023</a:t>
             </a:fld>
             <a:endParaRPr lang="es-ES"/>
           </a:p>
@@ -1440,7 +1448,7 @@
           <a:p>
             <a:fld id="{73A294DA-5B1F-406C-B1D4-C938C7055EF9}" type="datetimeFigureOut">
               <a:rPr lang="es-ES" smtClean="0"/>
-              <a:t>05/01/2023</a:t>
+              <a:t>06/01/2023</a:t>
             </a:fld>
             <a:endParaRPr lang="es-ES"/>
           </a:p>
@@ -1855,7 +1863,7 @@
           <a:p>
             <a:fld id="{73A294DA-5B1F-406C-B1D4-C938C7055EF9}" type="datetimeFigureOut">
               <a:rPr lang="es-ES" smtClean="0"/>
-              <a:t>05/01/2023</a:t>
+              <a:t>06/01/2023</a:t>
             </a:fld>
             <a:endParaRPr lang="es-ES"/>
           </a:p>
@@ -1997,7 +2005,7 @@
           <a:p>
             <a:fld id="{73A294DA-5B1F-406C-B1D4-C938C7055EF9}" type="datetimeFigureOut">
               <a:rPr lang="es-ES" smtClean="0"/>
-              <a:t>05/01/2023</a:t>
+              <a:t>06/01/2023</a:t>
             </a:fld>
             <a:endParaRPr lang="es-ES"/>
           </a:p>
@@ -2110,7 +2118,7 @@
           <a:p>
             <a:fld id="{73A294DA-5B1F-406C-B1D4-C938C7055EF9}" type="datetimeFigureOut">
               <a:rPr lang="es-ES" smtClean="0"/>
-              <a:t>05/01/2023</a:t>
+              <a:t>06/01/2023</a:t>
             </a:fld>
             <a:endParaRPr lang="es-ES"/>
           </a:p>
@@ -2423,7 +2431,7 @@
           <a:p>
             <a:fld id="{73A294DA-5B1F-406C-B1D4-C938C7055EF9}" type="datetimeFigureOut">
               <a:rPr lang="es-ES" smtClean="0"/>
-              <a:t>05/01/2023</a:t>
+              <a:t>06/01/2023</a:t>
             </a:fld>
             <a:endParaRPr lang="es-ES"/>
           </a:p>
@@ -2712,7 +2720,7 @@
           <a:p>
             <a:fld id="{73A294DA-5B1F-406C-B1D4-C938C7055EF9}" type="datetimeFigureOut">
               <a:rPr lang="es-ES" smtClean="0"/>
-              <a:t>05/01/2023</a:t>
+              <a:t>06/01/2023</a:t>
             </a:fld>
             <a:endParaRPr lang="es-ES"/>
           </a:p>
@@ -2955,7 +2963,7 @@
           <a:p>
             <a:fld id="{73A294DA-5B1F-406C-B1D4-C938C7055EF9}" type="datetimeFigureOut">
               <a:rPr lang="es-ES" smtClean="0"/>
-              <a:t>05/01/2023</a:t>
+              <a:t>06/01/2023</a:t>
             </a:fld>
             <a:endParaRPr lang="es-ES"/>
           </a:p>
@@ -3727,6 +3735,595 @@
 </p:sld>
 </file>
 
+<file path=ppt/slides/slide10.xml><?xml version="1.0" encoding="utf-8"?>
+<p:sld xmlns:a="http://schemas.openxmlformats.org/drawingml/2006/main" xmlns:r="http://schemas.openxmlformats.org/officeDocument/2006/relationships" xmlns:p="http://schemas.openxmlformats.org/presentationml/2006/main">
+  <p:cSld>
+    <p:spTree>
+      <p:nvGrpSpPr>
+        <p:cNvPr id="1" name=""/>
+        <p:cNvGrpSpPr/>
+        <p:nvPr/>
+      </p:nvGrpSpPr>
+      <p:grpSpPr>
+        <a:xfrm>
+          <a:off x="0" y="0"/>
+          <a:ext cx="0" cy="0"/>
+          <a:chOff x="0" y="0"/>
+          <a:chExt cx="0" cy="0"/>
+        </a:xfrm>
+      </p:grpSpPr>
+      <p:sp>
+        <p:nvSpPr>
+          <p:cNvPr id="4" name="TextBox 3">
+            <a:extLst>
+              <a:ext uri="{FF2B5EF4-FFF2-40B4-BE49-F238E27FC236}">
+                <a16:creationId xmlns:a16="http://schemas.microsoft.com/office/drawing/2014/main" id="{1AB9453E-4605-B8C4-0C71-3B23CE9F2773}"/>
+              </a:ext>
+            </a:extLst>
+          </p:cNvPr>
+          <p:cNvSpPr txBox="1"/>
+          <p:nvPr/>
+        </p:nvSpPr>
+        <p:spPr>
+          <a:xfrm>
+            <a:off x="440456" y="143702"/>
+            <a:ext cx="9559887" cy="523220"/>
+          </a:xfrm>
+          <a:prstGeom prst="rect">
+            <a:avLst/>
+          </a:prstGeom>
+          <a:noFill/>
+        </p:spPr>
+        <p:txBody>
+          <a:bodyPr wrap="square" rtlCol="0">
+            <a:spAutoFit/>
+          </a:bodyPr>
+          <a:lstStyle/>
+          <a:p>
+            <a:r>
+              <a:rPr lang="es-ES" sz="2800" b="1" dirty="0">
+                <a:solidFill>
+                  <a:srgbClr val="002060"/>
+                </a:solidFill>
+              </a:rPr>
+              <a:t>3. INTEGRACIÓN Y SELECCIÓN</a:t>
+            </a:r>
+          </a:p>
+        </p:txBody>
+      </p:sp>
+      <p:sp>
+        <p:nvSpPr>
+          <p:cNvPr id="6" name="TextBox 5">
+            <a:extLst>
+              <a:ext uri="{FF2B5EF4-FFF2-40B4-BE49-F238E27FC236}">
+                <a16:creationId xmlns:a16="http://schemas.microsoft.com/office/drawing/2014/main" id="{1FA76770-F660-DB19-61AA-87990F00E84D}"/>
+              </a:ext>
+            </a:extLst>
+          </p:cNvPr>
+          <p:cNvSpPr txBox="1"/>
+          <p:nvPr/>
+        </p:nvSpPr>
+        <p:spPr>
+          <a:xfrm>
+            <a:off x="440456" y="798287"/>
+            <a:ext cx="10864282" cy="464871"/>
+          </a:xfrm>
+          <a:prstGeom prst="rect">
+            <a:avLst/>
+          </a:prstGeom>
+          <a:noFill/>
+        </p:spPr>
+        <p:txBody>
+          <a:bodyPr wrap="square">
+            <a:spAutoFit/>
+          </a:bodyPr>
+          <a:lstStyle/>
+          <a:p>
+            <a:pPr algn="just">
+              <a:lnSpc>
+                <a:spcPct val="150000"/>
+              </a:lnSpc>
+            </a:pPr>
+            <a:r>
+              <a:rPr lang="es-ES" b="1" dirty="0">
+                <a:solidFill>
+                  <a:srgbClr val="002060"/>
+                </a:solidFill>
+              </a:rPr>
+              <a:t>DATOS DE VUELOS</a:t>
+            </a:r>
+            <a:endParaRPr lang="es-ES" b="1" dirty="0">
+              <a:solidFill>
+                <a:srgbClr val="002060"/>
+              </a:solidFill>
+              <a:sym typeface="Wingdings" panose="05000000000000000000" pitchFamily="2" charset="2"/>
+            </a:endParaRPr>
+          </a:p>
+        </p:txBody>
+      </p:sp>
+      <p:pic>
+        <p:nvPicPr>
+          <p:cNvPr id="5" name="Picture 4" descr="Graphical user interface, text, application, chat or text message&#10;&#10;Description automatically generated">
+            <a:extLst>
+              <a:ext uri="{FF2B5EF4-FFF2-40B4-BE49-F238E27FC236}">
+                <a16:creationId xmlns:a16="http://schemas.microsoft.com/office/drawing/2014/main" id="{6DDDD5D9-A9FE-2A79-7C5E-B7D1A464A414}"/>
+              </a:ext>
+            </a:extLst>
+          </p:cNvPr>
+          <p:cNvPicPr>
+            <a:picLocks noChangeAspect="1"/>
+          </p:cNvPicPr>
+          <p:nvPr/>
+        </p:nvPicPr>
+        <p:blipFill>
+          <a:blip r:embed="rId2">
+            <a:extLst>
+              <a:ext uri="{28A0092B-C50C-407E-A947-70E740481C1C}">
+                <a14:useLocalDpi xmlns:a14="http://schemas.microsoft.com/office/drawing/2010/main" val="0"/>
+              </a:ext>
+            </a:extLst>
+          </a:blip>
+          <a:stretch>
+            <a:fillRect/>
+          </a:stretch>
+        </p:blipFill>
+        <p:spPr>
+          <a:xfrm>
+            <a:off x="10526413" y="5892800"/>
+            <a:ext cx="1536622" cy="965200"/>
+          </a:xfrm>
+          <a:prstGeom prst="rect">
+            <a:avLst/>
+          </a:prstGeom>
+        </p:spPr>
+      </p:pic>
+    </p:spTree>
+    <p:extLst>
+      <p:ext uri="{BB962C8B-B14F-4D97-AF65-F5344CB8AC3E}">
+        <p14:creationId xmlns:p14="http://schemas.microsoft.com/office/powerpoint/2010/main" val="2272010027"/>
+      </p:ext>
+    </p:extLst>
+  </p:cSld>
+  <p:clrMapOvr>
+    <a:masterClrMapping/>
+  </p:clrMapOvr>
+</p:sld>
+</file>
+
+<file path=ppt/slides/slide11.xml><?xml version="1.0" encoding="utf-8"?>
+<p:sld xmlns:a="http://schemas.openxmlformats.org/drawingml/2006/main" xmlns:r="http://schemas.openxmlformats.org/officeDocument/2006/relationships" xmlns:p="http://schemas.openxmlformats.org/presentationml/2006/main">
+  <p:cSld>
+    <p:spTree>
+      <p:nvGrpSpPr>
+        <p:cNvPr id="1" name=""/>
+        <p:cNvGrpSpPr/>
+        <p:nvPr/>
+      </p:nvGrpSpPr>
+      <p:grpSpPr>
+        <a:xfrm>
+          <a:off x="0" y="0"/>
+          <a:ext cx="0" cy="0"/>
+          <a:chOff x="0" y="0"/>
+          <a:chExt cx="0" cy="0"/>
+        </a:xfrm>
+      </p:grpSpPr>
+      <p:sp>
+        <p:nvSpPr>
+          <p:cNvPr id="4" name="TextBox 3">
+            <a:extLst>
+              <a:ext uri="{FF2B5EF4-FFF2-40B4-BE49-F238E27FC236}">
+                <a16:creationId xmlns:a16="http://schemas.microsoft.com/office/drawing/2014/main" id="{1AB9453E-4605-B8C4-0C71-3B23CE9F2773}"/>
+              </a:ext>
+            </a:extLst>
+          </p:cNvPr>
+          <p:cNvSpPr txBox="1"/>
+          <p:nvPr/>
+        </p:nvSpPr>
+        <p:spPr>
+          <a:xfrm>
+            <a:off x="440456" y="143702"/>
+            <a:ext cx="9559887" cy="523220"/>
+          </a:xfrm>
+          <a:prstGeom prst="rect">
+            <a:avLst/>
+          </a:prstGeom>
+          <a:noFill/>
+        </p:spPr>
+        <p:txBody>
+          <a:bodyPr wrap="square" rtlCol="0">
+            <a:spAutoFit/>
+          </a:bodyPr>
+          <a:lstStyle/>
+          <a:p>
+            <a:r>
+              <a:rPr lang="es-ES" sz="2800" b="1" dirty="0">
+                <a:solidFill>
+                  <a:srgbClr val="002060"/>
+                </a:solidFill>
+              </a:rPr>
+              <a:t>3. INTEGRACIÓN Y SELECCIÓN</a:t>
+            </a:r>
+          </a:p>
+        </p:txBody>
+      </p:sp>
+      <p:sp>
+        <p:nvSpPr>
+          <p:cNvPr id="6" name="TextBox 5">
+            <a:extLst>
+              <a:ext uri="{FF2B5EF4-FFF2-40B4-BE49-F238E27FC236}">
+                <a16:creationId xmlns:a16="http://schemas.microsoft.com/office/drawing/2014/main" id="{1FA76770-F660-DB19-61AA-87990F00E84D}"/>
+              </a:ext>
+            </a:extLst>
+          </p:cNvPr>
+          <p:cNvSpPr txBox="1"/>
+          <p:nvPr/>
+        </p:nvSpPr>
+        <p:spPr>
+          <a:xfrm>
+            <a:off x="440456" y="1088573"/>
+            <a:ext cx="10864282" cy="464871"/>
+          </a:xfrm>
+          <a:prstGeom prst="rect">
+            <a:avLst/>
+          </a:prstGeom>
+          <a:noFill/>
+        </p:spPr>
+        <p:txBody>
+          <a:bodyPr wrap="square">
+            <a:spAutoFit/>
+          </a:bodyPr>
+          <a:lstStyle/>
+          <a:p>
+            <a:pPr algn="just">
+              <a:lnSpc>
+                <a:spcPct val="150000"/>
+              </a:lnSpc>
+            </a:pPr>
+            <a:r>
+              <a:rPr lang="es-ES" b="1" dirty="0">
+                <a:solidFill>
+                  <a:srgbClr val="002060"/>
+                </a:solidFill>
+              </a:rPr>
+              <a:t>DATOS DE VUELOS</a:t>
+            </a:r>
+            <a:endParaRPr lang="es-ES" b="1" dirty="0">
+              <a:solidFill>
+                <a:srgbClr val="002060"/>
+              </a:solidFill>
+              <a:sym typeface="Wingdings" panose="05000000000000000000" pitchFamily="2" charset="2"/>
+            </a:endParaRPr>
+          </a:p>
+        </p:txBody>
+      </p:sp>
+      <p:pic>
+        <p:nvPicPr>
+          <p:cNvPr id="5" name="Picture 4" descr="Graphical user interface, text, application, chat or text message&#10;&#10;Description automatically generated">
+            <a:extLst>
+              <a:ext uri="{FF2B5EF4-FFF2-40B4-BE49-F238E27FC236}">
+                <a16:creationId xmlns:a16="http://schemas.microsoft.com/office/drawing/2014/main" id="{6DDDD5D9-A9FE-2A79-7C5E-B7D1A464A414}"/>
+              </a:ext>
+            </a:extLst>
+          </p:cNvPr>
+          <p:cNvPicPr>
+            <a:picLocks noChangeAspect="1"/>
+          </p:cNvPicPr>
+          <p:nvPr/>
+        </p:nvPicPr>
+        <p:blipFill>
+          <a:blip r:embed="rId2">
+            <a:extLst>
+              <a:ext uri="{28A0092B-C50C-407E-A947-70E740481C1C}">
+                <a14:useLocalDpi xmlns:a14="http://schemas.microsoft.com/office/drawing/2010/main" val="0"/>
+              </a:ext>
+            </a:extLst>
+          </a:blip>
+          <a:stretch>
+            <a:fillRect/>
+          </a:stretch>
+        </p:blipFill>
+        <p:spPr>
+          <a:xfrm>
+            <a:off x="10526413" y="5892800"/>
+            <a:ext cx="1536622" cy="965200"/>
+          </a:xfrm>
+          <a:prstGeom prst="rect">
+            <a:avLst/>
+          </a:prstGeom>
+        </p:spPr>
+      </p:pic>
+    </p:spTree>
+    <p:extLst>
+      <p:ext uri="{BB962C8B-B14F-4D97-AF65-F5344CB8AC3E}">
+        <p14:creationId xmlns:p14="http://schemas.microsoft.com/office/powerpoint/2010/main" val="580590971"/>
+      </p:ext>
+    </p:extLst>
+  </p:cSld>
+  <p:clrMapOvr>
+    <a:masterClrMapping/>
+  </p:clrMapOvr>
+</p:sld>
+</file>
+
+<file path=ppt/slides/slide12.xml><?xml version="1.0" encoding="utf-8"?>
+<p:sld xmlns:a="http://schemas.openxmlformats.org/drawingml/2006/main" xmlns:r="http://schemas.openxmlformats.org/officeDocument/2006/relationships" xmlns:p="http://schemas.openxmlformats.org/presentationml/2006/main">
+  <p:cSld>
+    <p:spTree>
+      <p:nvGrpSpPr>
+        <p:cNvPr id="1" name=""/>
+        <p:cNvGrpSpPr/>
+        <p:nvPr/>
+      </p:nvGrpSpPr>
+      <p:grpSpPr>
+        <a:xfrm>
+          <a:off x="0" y="0"/>
+          <a:ext cx="0" cy="0"/>
+          <a:chOff x="0" y="0"/>
+          <a:chExt cx="0" cy="0"/>
+        </a:xfrm>
+      </p:grpSpPr>
+      <p:sp>
+        <p:nvSpPr>
+          <p:cNvPr id="4" name="TextBox 3">
+            <a:extLst>
+              <a:ext uri="{FF2B5EF4-FFF2-40B4-BE49-F238E27FC236}">
+                <a16:creationId xmlns:a16="http://schemas.microsoft.com/office/drawing/2014/main" id="{1AB9453E-4605-B8C4-0C71-3B23CE9F2773}"/>
+              </a:ext>
+            </a:extLst>
+          </p:cNvPr>
+          <p:cNvSpPr txBox="1"/>
+          <p:nvPr/>
+        </p:nvSpPr>
+        <p:spPr>
+          <a:xfrm>
+            <a:off x="440456" y="143702"/>
+            <a:ext cx="9559887" cy="523220"/>
+          </a:xfrm>
+          <a:prstGeom prst="rect">
+            <a:avLst/>
+          </a:prstGeom>
+          <a:noFill/>
+        </p:spPr>
+        <p:txBody>
+          <a:bodyPr wrap="square" rtlCol="0">
+            <a:spAutoFit/>
+          </a:bodyPr>
+          <a:lstStyle/>
+          <a:p>
+            <a:r>
+              <a:rPr lang="es-ES" sz="2800" b="1" dirty="0">
+                <a:solidFill>
+                  <a:srgbClr val="002060"/>
+                </a:solidFill>
+              </a:rPr>
+              <a:t>3. INTEGRACIÓN Y SELECCIÓN</a:t>
+            </a:r>
+          </a:p>
+        </p:txBody>
+      </p:sp>
+      <p:sp>
+        <p:nvSpPr>
+          <p:cNvPr id="6" name="TextBox 5">
+            <a:extLst>
+              <a:ext uri="{FF2B5EF4-FFF2-40B4-BE49-F238E27FC236}">
+                <a16:creationId xmlns:a16="http://schemas.microsoft.com/office/drawing/2014/main" id="{1FA76770-F660-DB19-61AA-87990F00E84D}"/>
+              </a:ext>
+            </a:extLst>
+          </p:cNvPr>
+          <p:cNvSpPr txBox="1"/>
+          <p:nvPr/>
+        </p:nvSpPr>
+        <p:spPr>
+          <a:xfrm>
+            <a:off x="440456" y="1088573"/>
+            <a:ext cx="10864282" cy="464871"/>
+          </a:xfrm>
+          <a:prstGeom prst="rect">
+            <a:avLst/>
+          </a:prstGeom>
+          <a:noFill/>
+        </p:spPr>
+        <p:txBody>
+          <a:bodyPr wrap="square">
+            <a:spAutoFit/>
+          </a:bodyPr>
+          <a:lstStyle/>
+          <a:p>
+            <a:pPr algn="just">
+              <a:lnSpc>
+                <a:spcPct val="150000"/>
+              </a:lnSpc>
+            </a:pPr>
+            <a:r>
+              <a:rPr lang="es-ES" b="1" dirty="0">
+                <a:solidFill>
+                  <a:srgbClr val="002060"/>
+                </a:solidFill>
+              </a:rPr>
+              <a:t>DATOS DE VUELOS</a:t>
+            </a:r>
+            <a:endParaRPr lang="es-ES" b="1" dirty="0">
+              <a:solidFill>
+                <a:srgbClr val="002060"/>
+              </a:solidFill>
+              <a:sym typeface="Wingdings" panose="05000000000000000000" pitchFamily="2" charset="2"/>
+            </a:endParaRPr>
+          </a:p>
+        </p:txBody>
+      </p:sp>
+      <p:pic>
+        <p:nvPicPr>
+          <p:cNvPr id="5" name="Picture 4" descr="Graphical user interface, text, application, chat or text message&#10;&#10;Description automatically generated">
+            <a:extLst>
+              <a:ext uri="{FF2B5EF4-FFF2-40B4-BE49-F238E27FC236}">
+                <a16:creationId xmlns:a16="http://schemas.microsoft.com/office/drawing/2014/main" id="{6DDDD5D9-A9FE-2A79-7C5E-B7D1A464A414}"/>
+              </a:ext>
+            </a:extLst>
+          </p:cNvPr>
+          <p:cNvPicPr>
+            <a:picLocks noChangeAspect="1"/>
+          </p:cNvPicPr>
+          <p:nvPr/>
+        </p:nvPicPr>
+        <p:blipFill>
+          <a:blip r:embed="rId2">
+            <a:extLst>
+              <a:ext uri="{28A0092B-C50C-407E-A947-70E740481C1C}">
+                <a14:useLocalDpi xmlns:a14="http://schemas.microsoft.com/office/drawing/2010/main" val="0"/>
+              </a:ext>
+            </a:extLst>
+          </a:blip>
+          <a:stretch>
+            <a:fillRect/>
+          </a:stretch>
+        </p:blipFill>
+        <p:spPr>
+          <a:xfrm>
+            <a:off x="10526413" y="5892800"/>
+            <a:ext cx="1536622" cy="965200"/>
+          </a:xfrm>
+          <a:prstGeom prst="rect">
+            <a:avLst/>
+          </a:prstGeom>
+        </p:spPr>
+      </p:pic>
+    </p:spTree>
+    <p:extLst>
+      <p:ext uri="{BB962C8B-B14F-4D97-AF65-F5344CB8AC3E}">
+        <p14:creationId xmlns:p14="http://schemas.microsoft.com/office/powerpoint/2010/main" val="3683916807"/>
+      </p:ext>
+    </p:extLst>
+  </p:cSld>
+  <p:clrMapOvr>
+    <a:masterClrMapping/>
+  </p:clrMapOvr>
+</p:sld>
+</file>
+
+<file path=ppt/slides/slide13.xml><?xml version="1.0" encoding="utf-8"?>
+<p:sld xmlns:a="http://schemas.openxmlformats.org/drawingml/2006/main" xmlns:r="http://schemas.openxmlformats.org/officeDocument/2006/relationships" xmlns:p="http://schemas.openxmlformats.org/presentationml/2006/main">
+  <p:cSld>
+    <p:spTree>
+      <p:nvGrpSpPr>
+        <p:cNvPr id="1" name=""/>
+        <p:cNvGrpSpPr/>
+        <p:nvPr/>
+      </p:nvGrpSpPr>
+      <p:grpSpPr>
+        <a:xfrm>
+          <a:off x="0" y="0"/>
+          <a:ext cx="0" cy="0"/>
+          <a:chOff x="0" y="0"/>
+          <a:chExt cx="0" cy="0"/>
+        </a:xfrm>
+      </p:grpSpPr>
+      <p:pic>
+        <p:nvPicPr>
+          <p:cNvPr id="5" name="Picture 4" descr="A picture containing background pattern&#10;&#10;Description automatically generated">
+            <a:extLst>
+              <a:ext uri="{FF2B5EF4-FFF2-40B4-BE49-F238E27FC236}">
+                <a16:creationId xmlns:a16="http://schemas.microsoft.com/office/drawing/2014/main" id="{784C299E-8C7E-2900-BA91-FB7854EBC0F8}"/>
+              </a:ext>
+            </a:extLst>
+          </p:cNvPr>
+          <p:cNvPicPr>
+            <a:picLocks noChangeAspect="1"/>
+          </p:cNvPicPr>
+          <p:nvPr/>
+        </p:nvPicPr>
+        <p:blipFill>
+          <a:blip r:embed="rId2">
+            <a:extLst>
+              <a:ext uri="{28A0092B-C50C-407E-A947-70E740481C1C}">
+                <a14:useLocalDpi xmlns:a14="http://schemas.microsoft.com/office/drawing/2010/main" val="0"/>
+              </a:ext>
+            </a:extLst>
+          </a:blip>
+          <a:stretch>
+            <a:fillRect/>
+          </a:stretch>
+        </p:blipFill>
+        <p:spPr>
+          <a:xfrm>
+            <a:off x="0" y="0"/>
+            <a:ext cx="3598333" cy="5223933"/>
+          </a:xfrm>
+          <a:prstGeom prst="rect">
+            <a:avLst/>
+          </a:prstGeom>
+        </p:spPr>
+      </p:pic>
+      <p:sp>
+        <p:nvSpPr>
+          <p:cNvPr id="6" name="TextBox 5">
+            <a:extLst>
+              <a:ext uri="{FF2B5EF4-FFF2-40B4-BE49-F238E27FC236}">
+                <a16:creationId xmlns:a16="http://schemas.microsoft.com/office/drawing/2014/main" id="{05E71A4F-1EDC-8862-D3C2-A33F056DD973}"/>
+              </a:ext>
+            </a:extLst>
+          </p:cNvPr>
+          <p:cNvSpPr txBox="1"/>
+          <p:nvPr/>
+        </p:nvSpPr>
+        <p:spPr>
+          <a:xfrm>
+            <a:off x="2408766" y="3105834"/>
+            <a:ext cx="7374467" cy="646331"/>
+          </a:xfrm>
+          <a:prstGeom prst="rect">
+            <a:avLst/>
+          </a:prstGeom>
+          <a:noFill/>
+        </p:spPr>
+        <p:txBody>
+          <a:bodyPr wrap="square" rtlCol="0">
+            <a:spAutoFit/>
+          </a:bodyPr>
+          <a:lstStyle/>
+          <a:p>
+            <a:pPr algn="ctr"/>
+            <a:r>
+              <a:rPr lang="es-ES" sz="3600" b="1" i="1" dirty="0">
+                <a:solidFill>
+                  <a:srgbClr val="002060"/>
+                </a:solidFill>
+                <a:latin typeface="Arial" panose="020B0604020202020204" pitchFamily="34" charset="0"/>
+                <a:ea typeface="+mj-ea"/>
+                <a:cs typeface="Arial" panose="020B0604020202020204" pitchFamily="34" charset="0"/>
+              </a:rPr>
+              <a:t>GRACIAS</a:t>
+            </a:r>
+            <a:r>
+              <a:rPr lang="es-ES" dirty="0"/>
+              <a:t> </a:t>
+            </a:r>
+            <a:r>
+              <a:rPr lang="es-ES" sz="3600" b="1" i="1" dirty="0">
+                <a:solidFill>
+                  <a:srgbClr val="002060"/>
+                </a:solidFill>
+                <a:latin typeface="Arial" panose="020B0604020202020204" pitchFamily="34" charset="0"/>
+                <a:ea typeface="+mj-ea"/>
+                <a:cs typeface="Arial" panose="020B0604020202020204" pitchFamily="34" charset="0"/>
+              </a:rPr>
+              <a:t>POR LA ATENCIÓN</a:t>
+            </a:r>
+          </a:p>
+        </p:txBody>
+      </p:sp>
+    </p:spTree>
+    <p:extLst>
+      <p:ext uri="{BB962C8B-B14F-4D97-AF65-F5344CB8AC3E}">
+        <p14:creationId xmlns:p14="http://schemas.microsoft.com/office/powerpoint/2010/main" val="391206523"/>
+      </p:ext>
+    </p:extLst>
+  </p:cSld>
+  <p:clrMapOvr>
+    <a:masterClrMapping/>
+  </p:clrMapOvr>
+</p:sld>
+</file>
+
 <file path=ppt/slides/slide2.xml><?xml version="1.0" encoding="utf-8"?>
 <p:sld xmlns:a="http://schemas.openxmlformats.org/drawingml/2006/main" xmlns:r="http://schemas.openxmlformats.org/officeDocument/2006/relationships" xmlns:p="http://schemas.openxmlformats.org/presentationml/2006/main">
   <p:cSld>
@@ -8422,48 +9019,12 @@
           <a:chExt cx="0" cy="0"/>
         </a:xfrm>
       </p:grpSpPr>
-      <p:pic>
-        <p:nvPicPr>
-          <p:cNvPr id="5" name="Picture 4" descr="A picture containing background pattern&#10;&#10;Description automatically generated">
-            <a:extLst>
-              <a:ext uri="{FF2B5EF4-FFF2-40B4-BE49-F238E27FC236}">
-                <a16:creationId xmlns:a16="http://schemas.microsoft.com/office/drawing/2014/main" id="{784C299E-8C7E-2900-BA91-FB7854EBC0F8}"/>
-              </a:ext>
-            </a:extLst>
-          </p:cNvPr>
-          <p:cNvPicPr>
-            <a:picLocks noChangeAspect="1"/>
-          </p:cNvPicPr>
-          <p:nvPr/>
-        </p:nvPicPr>
-        <p:blipFill>
-          <a:blip r:embed="rId2">
-            <a:extLst>
-              <a:ext uri="{28A0092B-C50C-407E-A947-70E740481C1C}">
-                <a14:useLocalDpi xmlns:a14="http://schemas.microsoft.com/office/drawing/2010/main" val="0"/>
-              </a:ext>
-            </a:extLst>
-          </a:blip>
-          <a:stretch>
-            <a:fillRect/>
-          </a:stretch>
-        </p:blipFill>
-        <p:spPr>
-          <a:xfrm>
-            <a:off x="0" y="0"/>
-            <a:ext cx="3598333" cy="5223933"/>
-          </a:xfrm>
-          <a:prstGeom prst="rect">
-            <a:avLst/>
-          </a:prstGeom>
-        </p:spPr>
-      </p:pic>
       <p:sp>
         <p:nvSpPr>
-          <p:cNvPr id="6" name="TextBox 5">
-            <a:extLst>
-              <a:ext uri="{FF2B5EF4-FFF2-40B4-BE49-F238E27FC236}">
-                <a16:creationId xmlns:a16="http://schemas.microsoft.com/office/drawing/2014/main" id="{05E71A4F-1EDC-8862-D3C2-A33F056DD973}"/>
+          <p:cNvPr id="4" name="TextBox 3">
+            <a:extLst>
+              <a:ext uri="{FF2B5EF4-FFF2-40B4-BE49-F238E27FC236}">
+                <a16:creationId xmlns:a16="http://schemas.microsoft.com/office/drawing/2014/main" id="{1AB9453E-4605-B8C4-0C71-3B23CE9F2773}"/>
               </a:ext>
             </a:extLst>
           </p:cNvPr>
@@ -8472,8 +9033,8 @@
         </p:nvSpPr>
         <p:spPr>
           <a:xfrm>
-            <a:off x="2408766" y="3105834"/>
-            <a:ext cx="7374467" cy="646331"/>
+            <a:off x="440456" y="143702"/>
+            <a:ext cx="9559887" cy="523220"/>
           </a:xfrm>
           <a:prstGeom prst="rect">
             <a:avLst/>
@@ -8486,40 +9047,107 @@
           </a:bodyPr>
           <a:lstStyle/>
           <a:p>
-            <a:pPr algn="ctr"/>
-            <a:r>
-              <a:rPr lang="es-ES" sz="3600" b="1" i="1" dirty="0">
-                <a:solidFill>
-                  <a:srgbClr val="002060"/>
-                </a:solidFill>
-                <a:latin typeface="Arial" panose="020B0604020202020204" pitchFamily="34" charset="0"/>
-                <a:ea typeface="+mj-ea"/>
-                <a:cs typeface="Arial" panose="020B0604020202020204" pitchFamily="34" charset="0"/>
-              </a:rPr>
-              <a:t>GRACIAS</a:t>
-            </a:r>
-            <a:r>
-              <a:rPr lang="es-ES" dirty="0"/>
-              <a:t> </a:t>
-            </a:r>
-            <a:r>
-              <a:rPr lang="es-ES" sz="3600" b="1" i="1" dirty="0">
-                <a:solidFill>
-                  <a:srgbClr val="002060"/>
-                </a:solidFill>
-                <a:latin typeface="Arial" panose="020B0604020202020204" pitchFamily="34" charset="0"/>
-                <a:ea typeface="+mj-ea"/>
-                <a:cs typeface="Arial" panose="020B0604020202020204" pitchFamily="34" charset="0"/>
-              </a:rPr>
-              <a:t>POR LA ATENCIÓN</a:t>
+            <a:r>
+              <a:rPr lang="es-ES" sz="2800" b="1" dirty="0">
+                <a:solidFill>
+                  <a:srgbClr val="002060"/>
+                </a:solidFill>
+              </a:rPr>
+              <a:t>3. INTEGRACIÓN Y SELECCIÓN</a:t>
             </a:r>
           </a:p>
         </p:txBody>
       </p:sp>
+      <p:sp>
+        <p:nvSpPr>
+          <p:cNvPr id="6" name="TextBox 5">
+            <a:extLst>
+              <a:ext uri="{FF2B5EF4-FFF2-40B4-BE49-F238E27FC236}">
+                <a16:creationId xmlns:a16="http://schemas.microsoft.com/office/drawing/2014/main" id="{1FA76770-F660-DB19-61AA-87990F00E84D}"/>
+              </a:ext>
+            </a:extLst>
+          </p:cNvPr>
+          <p:cNvSpPr txBox="1"/>
+          <p:nvPr/>
+        </p:nvSpPr>
+        <p:spPr>
+          <a:xfrm>
+            <a:off x="440456" y="1088573"/>
+            <a:ext cx="10864282" cy="464871"/>
+          </a:xfrm>
+          <a:prstGeom prst="rect">
+            <a:avLst/>
+          </a:prstGeom>
+          <a:noFill/>
+        </p:spPr>
+        <p:txBody>
+          <a:bodyPr wrap="square">
+            <a:spAutoFit/>
+          </a:bodyPr>
+          <a:lstStyle/>
+          <a:p>
+            <a:pPr algn="just">
+              <a:lnSpc>
+                <a:spcPct val="150000"/>
+              </a:lnSpc>
+            </a:pPr>
+            <a:r>
+              <a:rPr lang="es-ES" b="1" dirty="0">
+                <a:solidFill>
+                  <a:srgbClr val="002060"/>
+                </a:solidFill>
+              </a:rPr>
+              <a:t>DATOS DE VUELOS</a:t>
+            </a:r>
+            <a:endParaRPr lang="es-ES" b="1" dirty="0">
+              <a:solidFill>
+                <a:srgbClr val="002060"/>
+              </a:solidFill>
+              <a:sym typeface="Wingdings" panose="05000000000000000000" pitchFamily="2" charset="2"/>
+            </a:endParaRPr>
+          </a:p>
+        </p:txBody>
+      </p:sp>
+      <p:pic>
+        <p:nvPicPr>
+          <p:cNvPr id="5" name="Picture 4" descr="Graphical user interface, text, application, chat or text message&#10;&#10;Description automatically generated">
+            <a:extLst>
+              <a:ext uri="{FF2B5EF4-FFF2-40B4-BE49-F238E27FC236}">
+                <a16:creationId xmlns:a16="http://schemas.microsoft.com/office/drawing/2014/main" id="{6DDDD5D9-A9FE-2A79-7C5E-B7D1A464A414}"/>
+              </a:ext>
+            </a:extLst>
+          </p:cNvPr>
+          <p:cNvPicPr>
+            <a:picLocks noChangeAspect="1"/>
+          </p:cNvPicPr>
+          <p:nvPr/>
+        </p:nvPicPr>
+        <p:blipFill>
+          <a:blip r:embed="rId2">
+            <a:extLst>
+              <a:ext uri="{28A0092B-C50C-407E-A947-70E740481C1C}">
+                <a14:useLocalDpi xmlns:a14="http://schemas.microsoft.com/office/drawing/2010/main" val="0"/>
+              </a:ext>
+            </a:extLst>
+          </a:blip>
+          <a:stretch>
+            <a:fillRect/>
+          </a:stretch>
+        </p:blipFill>
+        <p:spPr>
+          <a:xfrm>
+            <a:off x="10526413" y="5892800"/>
+            <a:ext cx="1536622" cy="965200"/>
+          </a:xfrm>
+          <a:prstGeom prst="rect">
+            <a:avLst/>
+          </a:prstGeom>
+        </p:spPr>
+      </p:pic>
     </p:spTree>
     <p:extLst>
       <p:ext uri="{BB962C8B-B14F-4D97-AF65-F5344CB8AC3E}">
-        <p14:creationId xmlns:p14="http://schemas.microsoft.com/office/powerpoint/2010/main" val="391206523"/>
+        <p14:creationId xmlns:p14="http://schemas.microsoft.com/office/powerpoint/2010/main" val="2243436159"/>
       </p:ext>
     </p:extLst>
   </p:cSld>

</xml_diff>

<commit_message>
Finishing Memoria and PPT; Checking code
</commit_message>
<xml_diff>
--- a/Memoria_pres.pptx
+++ b/Memoria_pres.pptx
@@ -14,8 +14,8 @@
     <p:sldId id="281" r:id="rId8"/>
     <p:sldId id="282" r:id="rId9"/>
     <p:sldId id="283" r:id="rId10"/>
-    <p:sldId id="284" r:id="rId11"/>
-    <p:sldId id="285" r:id="rId12"/>
+    <p:sldId id="294" r:id="rId11"/>
+    <p:sldId id="284" r:id="rId12"/>
     <p:sldId id="286" r:id="rId13"/>
     <p:sldId id="288" r:id="rId14"/>
     <p:sldId id="289" r:id="rId15"/>
@@ -136,8 +136,8 @@
             <p14:sldId id="281"/>
             <p14:sldId id="282"/>
             <p14:sldId id="283"/>
+            <p14:sldId id="294"/>
             <p14:sldId id="284"/>
-            <p14:sldId id="285"/>
             <p14:sldId id="286"/>
             <p14:sldId id="288"/>
             <p14:sldId id="289"/>
@@ -3129,10 +3129,10 @@
     <dgm:cxn modelId="{8AF74424-F329-FC49-B506-4D761EF486ED}" type="presOf" srcId="{EF1185AE-C50F-F545-A7DF-F773CFDD6ACB}" destId="{5409C6C1-0E28-C748-A449-2EBE04AACA35}" srcOrd="1" destOrd="0" presId="urn:microsoft.com/office/officeart/2005/8/layout/vProcess5"/>
     <dgm:cxn modelId="{B6F25928-1C50-584B-8C88-DAC3ABDF22B0}" type="presOf" srcId="{C17FEE4A-8A09-5645-87B4-1B77E7E9E30B}" destId="{09F957A7-3730-DB48-B533-559E6783C573}" srcOrd="0" destOrd="0" presId="urn:microsoft.com/office/officeart/2005/8/layout/vProcess5"/>
     <dgm:cxn modelId="{DE21BF2E-0195-7F4F-BB84-A3CB05658E2D}" srcId="{DBD4B207-E739-4448-B73A-A1908D0C19C9}" destId="{0C9DB628-107A-394D-9DE4-D764D8966AE5}" srcOrd="4" destOrd="0" parTransId="{15649590-0E1C-5644-B7F3-5FCC4FAD83C1}" sibTransId="{F69DB093-57E3-7C4F-B758-960136179907}"/>
+    <dgm:cxn modelId="{D928AB66-0455-5542-B77F-683C188574AD}" type="presOf" srcId="{C17FEE4A-8A09-5645-87B4-1B77E7E9E30B}" destId="{CD96E06C-62BE-4F41-AD4F-A595088DF385}" srcOrd="1" destOrd="0" presId="urn:microsoft.com/office/officeart/2005/8/layout/vProcess5"/>
     <dgm:cxn modelId="{A42BDB4C-B43C-2343-9FC4-2B196AB1DEC1}" type="presOf" srcId="{751B48B7-51CF-8F43-81E1-4E829340731D}" destId="{AAB7B6BE-73AC-FD48-8868-D26FFBCAEE7B}" srcOrd="0" destOrd="0" presId="urn:microsoft.com/office/officeart/2005/8/layout/vProcess5"/>
+    <dgm:cxn modelId="{B46BC871-F6A1-2A45-8794-E723751344DA}" type="presOf" srcId="{0C9DB628-107A-394D-9DE4-D764D8966AE5}" destId="{F7396D1B-13AC-434E-91C0-E3AC39ED3FF8}" srcOrd="0" destOrd="0" presId="urn:microsoft.com/office/officeart/2005/8/layout/vProcess5"/>
     <dgm:cxn modelId="{8811E354-CE42-8942-ADC7-D251A0B45C3C}" type="presOf" srcId="{EF1185AE-C50F-F545-A7DF-F773CFDD6ACB}" destId="{FBB442C6-6A8B-964D-B6A3-A50052BF110E}" srcOrd="0" destOrd="0" presId="urn:microsoft.com/office/officeart/2005/8/layout/vProcess5"/>
-    <dgm:cxn modelId="{D928AB66-0455-5542-B77F-683C188574AD}" type="presOf" srcId="{C17FEE4A-8A09-5645-87B4-1B77E7E9E30B}" destId="{CD96E06C-62BE-4F41-AD4F-A595088DF385}" srcOrd="1" destOrd="0" presId="urn:microsoft.com/office/officeart/2005/8/layout/vProcess5"/>
-    <dgm:cxn modelId="{B46BC871-F6A1-2A45-8794-E723751344DA}" type="presOf" srcId="{0C9DB628-107A-394D-9DE4-D764D8966AE5}" destId="{F7396D1B-13AC-434E-91C0-E3AC39ED3FF8}" srcOrd="0" destOrd="0" presId="urn:microsoft.com/office/officeart/2005/8/layout/vProcess5"/>
     <dgm:cxn modelId="{BB4DA286-80B9-9046-8BA6-53F06B3350E9}" type="presOf" srcId="{C1C7179B-41DD-6C4A-8732-AF83FF30EE4B}" destId="{038A1066-8266-7640-9E1A-8972A37E2DD2}" srcOrd="0" destOrd="0" presId="urn:microsoft.com/office/officeart/2005/8/layout/vProcess5"/>
     <dgm:cxn modelId="{8794E589-0AF3-B845-AB8D-AEE4DC42670E}" type="presOf" srcId="{DBD4B207-E739-4448-B73A-A1908D0C19C9}" destId="{7C74D5C8-F840-974A-A259-3017936A67E8}" srcOrd="0" destOrd="0" presId="urn:microsoft.com/office/officeart/2005/8/layout/vProcess5"/>
     <dgm:cxn modelId="{3B863E9C-2326-594B-A032-7299C88654B6}" srcId="{DBD4B207-E739-4448-B73A-A1908D0C19C9}" destId="{751B48B7-51CF-8F43-81E1-4E829340731D}" srcOrd="1" destOrd="0" parTransId="{8BBB9420-C289-DF43-9FE5-244DED554876}" sibTransId="{6069F0F9-2F9B-F940-A604-665D3CECDA12}"/>
@@ -5732,38 +5732,38 @@
     <dgm:cxn modelId="{EB4AC73A-8536-9544-81CE-BCB700F0DF17}" srcId="{71AAE4DF-DDA9-4949-AD48-6F122CAFD057}" destId="{BA69E4BF-DAB0-7E47-9C50-10FBF59DA58F}" srcOrd="6" destOrd="0" parTransId="{41A38DEB-04F1-A74F-9C95-6A3925EE8857}" sibTransId="{873BDE57-7CC2-0440-82CE-B658469E3861}"/>
     <dgm:cxn modelId="{8DF24F3C-496F-4D41-90D4-4919AB497003}" srcId="{28D5221A-BD74-3D4B-AFB4-4550713B6A46}" destId="{63F9CB0A-1442-A443-A2CC-BDA05E7E2202}" srcOrd="0" destOrd="0" parTransId="{DEC80EDC-48A9-6F4A-91F3-FF9EC7B7432C}" sibTransId="{C71E81B2-057C-1B40-80B5-D59FE4EC5B01}"/>
     <dgm:cxn modelId="{6A2AF43C-CE6C-944C-BB0D-526B75DCB36A}" srcId="{0A895738-3D40-E74A-B397-D507CCF0DD94}" destId="{CFD95037-DBE9-9446-AB53-4E6BACDF12FC}" srcOrd="1" destOrd="0" parTransId="{E46D758E-046D-8F4C-A24E-EA349855564C}" sibTransId="{59C68D5B-CC5D-F348-9F50-AF51690F1EB8}"/>
+    <dgm:cxn modelId="{5A4CED5E-3FCA-DF42-B300-CBA2CCBCF4CA}" type="presOf" srcId="{C6FE8727-257A-8047-8E43-E27FCE69CC84}" destId="{DAB8C1E6-595B-3749-86CB-01C31DF4F5B6}" srcOrd="0" destOrd="10" presId="urn:microsoft.com/office/officeart/2005/8/layout/hList1"/>
+    <dgm:cxn modelId="{DA009D5F-BC16-F94D-9B7D-725A2D7BAB65}" srcId="{63F9CB0A-1442-A443-A2CC-BDA05E7E2202}" destId="{5B289611-B3C7-5F49-B2B2-5E26789841AA}" srcOrd="7" destOrd="0" parTransId="{03D39601-6438-A146-BE76-1F45672854BA}" sibTransId="{4D2CDD66-84BF-D644-91EE-CD39B324C580}"/>
     <dgm:cxn modelId="{0DCF8941-1736-0447-BC18-8F489BCE9C30}" srcId="{71AAE4DF-DDA9-4949-AD48-6F122CAFD057}" destId="{38D892D8-ED0F-6F41-B291-C9FF143724CA}" srcOrd="1" destOrd="0" parTransId="{3859C20E-5D4C-C546-BC75-63B20C1FFD6C}" sibTransId="{450E1B8C-513C-E049-9694-A8036905AB43}"/>
     <dgm:cxn modelId="{F58F9E42-9737-FD4E-8C56-50ABD310EB64}" type="presOf" srcId="{74B7F226-0836-874F-A3BF-207C591BB9FB}" destId="{635F0EEB-03D4-EB4D-9D46-58D81B829861}" srcOrd="0" destOrd="0" presId="urn:microsoft.com/office/officeart/2005/8/layout/hList1"/>
     <dgm:cxn modelId="{9182CE42-8264-0749-8D1B-72CF381A2FE1}" type="presOf" srcId="{ECA19826-E131-3143-8170-6FB978E3B754}" destId="{2B6E9592-A682-6345-BF16-231F2137BE1B}" srcOrd="0" destOrd="3" presId="urn:microsoft.com/office/officeart/2005/8/layout/hList1"/>
+    <dgm:cxn modelId="{DE5FED62-22E0-9847-B18B-8944F01FED78}" srcId="{71AAE4DF-DDA9-4949-AD48-6F122CAFD057}" destId="{1A8C27D0-72C6-5044-8526-797A288D9FB8}" srcOrd="8" destOrd="0" parTransId="{BF4D1E34-1730-3149-B143-4DA14F6CC138}" sibTransId="{3F1D6CBC-1C47-F240-A5D3-7F3BE51E15C7}"/>
     <dgm:cxn modelId="{AA1C1B43-00AA-CD43-BADA-3CABCF9DEA3F}" srcId="{71AAE4DF-DDA9-4949-AD48-6F122CAFD057}" destId="{DFBDC719-3909-9848-9B3E-9161F2C816B5}" srcOrd="0" destOrd="0" parTransId="{E3501F49-5B79-1A42-9160-8689D5B425AE}" sibTransId="{F9A939A6-370A-9646-A802-335EC3E76F01}"/>
     <dgm:cxn modelId="{ACB83243-3E15-0047-B126-0DB74F786719}" type="presOf" srcId="{33F87B13-A418-8349-B69D-B780D63F2FDA}" destId="{635F0EEB-03D4-EB4D-9D46-58D81B829861}" srcOrd="0" destOrd="3" presId="urn:microsoft.com/office/officeart/2005/8/layout/hList1"/>
     <dgm:cxn modelId="{1455AE45-EF51-E04B-9D63-6CD0F1941968}" srcId="{EE002E70-1BA6-414C-9812-44CC66DBF2F7}" destId="{B39BE120-7AA2-5844-B3DE-0FADA010FAFF}" srcOrd="6" destOrd="0" parTransId="{7B870378-EE58-894F-91E1-6AE0EF0BE966}" sibTransId="{09EB3438-EB29-9140-ACF3-893E96C366B4}"/>
+    <dgm:cxn modelId="{698E1966-86C6-2547-AC00-2FEF6A911E04}" type="presOf" srcId="{350484AC-729C-1E4F-8F60-D25F1B7D92AC}" destId="{2B6E9592-A682-6345-BF16-231F2137BE1B}" srcOrd="0" destOrd="11" presId="urn:microsoft.com/office/officeart/2005/8/layout/hList1"/>
     <dgm:cxn modelId="{11B74846-CE22-5F41-ADAE-817B401D7A78}" type="presOf" srcId="{DB8F49CC-0EAE-C943-8887-E112FC932742}" destId="{2B6E9592-A682-6345-BF16-231F2137BE1B}" srcOrd="0" destOrd="18" presId="urn:microsoft.com/office/officeart/2005/8/layout/hList1"/>
+    <dgm:cxn modelId="{FB0F6167-DA1A-8046-AF67-2950F6C79EE0}" srcId="{EE002E70-1BA6-414C-9812-44CC66DBF2F7}" destId="{EE9B25DB-61EB-1045-BC70-1F3C64B65356}" srcOrd="7" destOrd="0" parTransId="{F7053BE5-057A-1C40-8803-5A4671AC87C8}" sibTransId="{30DDA3EF-ED21-0745-811B-C8E5175528D3}"/>
     <dgm:cxn modelId="{F75B6747-C927-AC44-8EFF-83123EFDFCA4}" type="presOf" srcId="{DE92C2D8-B338-3D4D-9994-8CB589DBF76F}" destId="{635F0EEB-03D4-EB4D-9D46-58D81B829861}" srcOrd="0" destOrd="7" presId="urn:microsoft.com/office/officeart/2005/8/layout/hList1"/>
+    <dgm:cxn modelId="{B4623368-49AF-8745-97B2-A793E8F4A78A}" srcId="{713F20A0-BF72-EE43-A8DD-AF185C4B82DC}" destId="{EB634E8C-7C66-7248-9503-36E83DCFFDFA}" srcOrd="2" destOrd="0" parTransId="{A58FFCAF-CA74-D64B-BCBC-313FD4181AC0}" sibTransId="{C89FDDCB-23D7-5B4E-B676-48C917624C53}"/>
     <dgm:cxn modelId="{37DB8149-1371-0C44-8E51-10B8CEA46720}" type="presOf" srcId="{BA69E4BF-DAB0-7E47-9C50-10FBF59DA58F}" destId="{0ACA845D-9FC2-6344-8148-7E8CA16E5E7F}" srcOrd="0" destOrd="7" presId="urn:microsoft.com/office/officeart/2005/8/layout/hList1"/>
     <dgm:cxn modelId="{35AC254A-D83D-5949-A175-3E4E35EB11C1}" type="presOf" srcId="{47063CA0-0CBE-7D49-B314-4F9DB3528C0B}" destId="{0ACA845D-9FC2-6344-8148-7E8CA16E5E7F}" srcOrd="0" destOrd="11" presId="urn:microsoft.com/office/officeart/2005/8/layout/hList1"/>
+    <dgm:cxn modelId="{F0A3286B-BA3C-FD4D-928F-03586CEEC86B}" srcId="{A6D7846F-3016-9146-9509-5F44F23CA934}" destId="{DB8F49CC-0EAE-C943-8887-E112FC932742}" srcOrd="0" destOrd="0" parTransId="{E3E04408-6FAC-664A-9207-A94A01C510DF}" sibTransId="{6FF47A1D-092D-9048-B35D-3C0D6759CB27}"/>
+    <dgm:cxn modelId="{CFC25A6B-9F2E-1F48-B29C-5490C5C944B0}" type="presOf" srcId="{8D2B03F3-2622-FD40-8963-81F8268332EB}" destId="{2B6E9592-A682-6345-BF16-231F2137BE1B}" srcOrd="0" destOrd="5" presId="urn:microsoft.com/office/officeart/2005/8/layout/hList1"/>
     <dgm:cxn modelId="{5A8B324C-9A73-EC43-AD3F-904C10AB887D}" srcId="{8FCAC36B-883B-CB49-B2A9-1726890C69CC}" destId="{A6D7846F-3016-9146-9509-5F44F23CA934}" srcOrd="2" destOrd="0" parTransId="{C7B8E429-BAE6-E549-A96E-B092531533E0}" sibTransId="{46DE24CA-6CE7-3D46-9E35-9921E19A126E}"/>
     <dgm:cxn modelId="{A62C614F-8881-024F-8DC0-C829BF89A990}" type="presOf" srcId="{016DAD64-638E-6240-8EF1-2E8C1B9034C7}" destId="{DAB8C1E6-595B-3749-86CB-01C31DF4F5B6}" srcOrd="0" destOrd="1" presId="urn:microsoft.com/office/officeart/2005/8/layout/hList1"/>
+    <dgm:cxn modelId="{572FEC6F-8262-404D-8F02-18EDD128C399}" srcId="{EE002E70-1BA6-414C-9812-44CC66DBF2F7}" destId="{1A5BA3FE-2D76-3845-96BA-348535CEB8D1}" srcOrd="8" destOrd="0" parTransId="{33965CB0-F7AF-C142-B4EE-6D0EF10D84F5}" sibTransId="{649EEE7D-1563-4248-929D-5CD9299F51A6}"/>
     <dgm:cxn modelId="{4A021050-6BB4-F74E-9BD3-172BBE6445EB}" type="presOf" srcId="{8FCAC36B-883B-CB49-B2A9-1726890C69CC}" destId="{F52438EA-4F92-C240-AFC6-A4B2AEE6AE1C}" srcOrd="0" destOrd="0" presId="urn:microsoft.com/office/officeart/2005/8/layout/hList1"/>
+    <dgm:cxn modelId="{7981D070-E1DA-F441-A142-C50A813AD130}" type="presOf" srcId="{9E251CFC-2A5F-6C42-99D3-BF9BD8EA3EBF}" destId="{DAB8C1E6-595B-3749-86CB-01C31DF4F5B6}" srcOrd="0" destOrd="4" presId="urn:microsoft.com/office/officeart/2005/8/layout/hList1"/>
+    <dgm:cxn modelId="{FD242F71-EE05-3744-BB89-9DE25B5B883E}" type="presOf" srcId="{730D7575-CD34-6C45-9E2D-E56BBC486051}" destId="{0ACA845D-9FC2-6344-8148-7E8CA16E5E7F}" srcOrd="0" destOrd="3" presId="urn:microsoft.com/office/officeart/2005/8/layout/hList1"/>
+    <dgm:cxn modelId="{E2D06871-2BE9-2F41-B849-B0A88E7ED468}" srcId="{63F9CB0A-1442-A443-A2CC-BDA05E7E2202}" destId="{016DAD64-638E-6240-8EF1-2E8C1B9034C7}" srcOrd="0" destOrd="0" parTransId="{DD27D5DA-3834-AB41-828E-98111BE13A1F}" sibTransId="{85689B27-C725-8E4A-A5B6-FB715F75B1B6}"/>
+    <dgm:cxn modelId="{17C6DA72-945A-DE49-901E-57CE0D6BFAD0}" srcId="{819E0C5A-1403-8E41-AAA1-DCD6DD60F058}" destId="{8FCAC36B-883B-CB49-B2A9-1726890C69CC}" srcOrd="3" destOrd="0" parTransId="{E8A03A2C-CA25-EF4D-BF6A-78335E2FE77E}" sibTransId="{D384A8A0-6BAF-884B-BCF0-7AFB8CACFA43}"/>
+    <dgm:cxn modelId="{31264873-1CCA-0944-A0B2-E46D826F39BE}" srcId="{71AAE4DF-DDA9-4949-AD48-6F122CAFD057}" destId="{89E0EB89-7578-E44F-95F9-AF1B2C0F7218}" srcOrd="3" destOrd="0" parTransId="{1EE453C3-B777-2F4F-A36B-B9FDAC3C9150}" sibTransId="{B87A37A3-39B3-B348-903D-BCECF88EB2CC}"/>
     <dgm:cxn modelId="{74B1EC53-1C8F-1F4A-B1CC-C8B5BE590143}" type="presOf" srcId="{6DFC3944-BEA1-F940-ACC7-4FABDF550A56}" destId="{313A1F4D-7CB2-F642-B354-0BDB9ACDF771}" srcOrd="0" destOrd="2" presId="urn:microsoft.com/office/officeart/2005/8/layout/hList1"/>
     <dgm:cxn modelId="{799A2054-F982-8F46-B1C0-73F1B68A7EAC}" type="presOf" srcId="{1A8C27D0-72C6-5044-8526-797A288D9FB8}" destId="{0ACA845D-9FC2-6344-8148-7E8CA16E5E7F}" srcOrd="0" destOrd="9" presId="urn:microsoft.com/office/officeart/2005/8/layout/hList1"/>
     <dgm:cxn modelId="{E8A40256-DAA7-BE47-8BA7-2A4A854BE47B}" type="presOf" srcId="{C835637C-F65B-4A4C-999A-7798918F06BA}" destId="{0ACA845D-9FC2-6344-8148-7E8CA16E5E7F}" srcOrd="0" destOrd="13" presId="urn:microsoft.com/office/officeart/2005/8/layout/hList1"/>
     <dgm:cxn modelId="{318D0458-4882-9241-B8F1-A29B8088BB8D}" srcId="{EE002E70-1BA6-414C-9812-44CC66DBF2F7}" destId="{8F7E1E02-2D70-E04C-90D8-652953180D13}" srcOrd="13" destOrd="0" parTransId="{F80D8DF8-3180-604A-B834-4B3FB4A29CB8}" sibTransId="{93CC8377-6516-F14B-A912-AEC5AE8C1DA1}"/>
     <dgm:cxn modelId="{0C0B6A58-4CDB-DF4E-9B2F-5157383B2868}" srcId="{EE002E70-1BA6-414C-9812-44CC66DBF2F7}" destId="{ECA19826-E131-3143-8170-6FB978E3B754}" srcOrd="2" destOrd="0" parTransId="{A195020A-7C37-EB48-8F08-FC8230E32CC9}" sibTransId="{0FE27D84-46BF-8849-8331-1A5FC8DD2C73}"/>
-    <dgm:cxn modelId="{5A4CED5E-3FCA-DF42-B300-CBA2CCBCF4CA}" type="presOf" srcId="{C6FE8727-257A-8047-8E43-E27FCE69CC84}" destId="{DAB8C1E6-595B-3749-86CB-01C31DF4F5B6}" srcOrd="0" destOrd="10" presId="urn:microsoft.com/office/officeart/2005/8/layout/hList1"/>
-    <dgm:cxn modelId="{DA009D5F-BC16-F94D-9B7D-725A2D7BAB65}" srcId="{63F9CB0A-1442-A443-A2CC-BDA05E7E2202}" destId="{5B289611-B3C7-5F49-B2B2-5E26789841AA}" srcOrd="7" destOrd="0" parTransId="{03D39601-6438-A146-BE76-1F45672854BA}" sibTransId="{4D2CDD66-84BF-D644-91EE-CD39B324C580}"/>
-    <dgm:cxn modelId="{DE5FED62-22E0-9847-B18B-8944F01FED78}" srcId="{71AAE4DF-DDA9-4949-AD48-6F122CAFD057}" destId="{1A8C27D0-72C6-5044-8526-797A288D9FB8}" srcOrd="8" destOrd="0" parTransId="{BF4D1E34-1730-3149-B143-4DA14F6CC138}" sibTransId="{3F1D6CBC-1C47-F240-A5D3-7F3BE51E15C7}"/>
-    <dgm:cxn modelId="{698E1966-86C6-2547-AC00-2FEF6A911E04}" type="presOf" srcId="{350484AC-729C-1E4F-8F60-D25F1B7D92AC}" destId="{2B6E9592-A682-6345-BF16-231F2137BE1B}" srcOrd="0" destOrd="11" presId="urn:microsoft.com/office/officeart/2005/8/layout/hList1"/>
-    <dgm:cxn modelId="{FB0F6167-DA1A-8046-AF67-2950F6C79EE0}" srcId="{EE002E70-1BA6-414C-9812-44CC66DBF2F7}" destId="{EE9B25DB-61EB-1045-BC70-1F3C64B65356}" srcOrd="7" destOrd="0" parTransId="{F7053BE5-057A-1C40-8803-5A4671AC87C8}" sibTransId="{30DDA3EF-ED21-0745-811B-C8E5175528D3}"/>
-    <dgm:cxn modelId="{B4623368-49AF-8745-97B2-A793E8F4A78A}" srcId="{713F20A0-BF72-EE43-A8DD-AF185C4B82DC}" destId="{EB634E8C-7C66-7248-9503-36E83DCFFDFA}" srcOrd="2" destOrd="0" parTransId="{A58FFCAF-CA74-D64B-BCBC-313FD4181AC0}" sibTransId="{C89FDDCB-23D7-5B4E-B676-48C917624C53}"/>
-    <dgm:cxn modelId="{F0A3286B-BA3C-FD4D-928F-03586CEEC86B}" srcId="{A6D7846F-3016-9146-9509-5F44F23CA934}" destId="{DB8F49CC-0EAE-C943-8887-E112FC932742}" srcOrd="0" destOrd="0" parTransId="{E3E04408-6FAC-664A-9207-A94A01C510DF}" sibTransId="{6FF47A1D-092D-9048-B35D-3C0D6759CB27}"/>
-    <dgm:cxn modelId="{CFC25A6B-9F2E-1F48-B29C-5490C5C944B0}" type="presOf" srcId="{8D2B03F3-2622-FD40-8963-81F8268332EB}" destId="{2B6E9592-A682-6345-BF16-231F2137BE1B}" srcOrd="0" destOrd="5" presId="urn:microsoft.com/office/officeart/2005/8/layout/hList1"/>
-    <dgm:cxn modelId="{572FEC6F-8262-404D-8F02-18EDD128C399}" srcId="{EE002E70-1BA6-414C-9812-44CC66DBF2F7}" destId="{1A5BA3FE-2D76-3845-96BA-348535CEB8D1}" srcOrd="8" destOrd="0" parTransId="{33965CB0-F7AF-C142-B4EE-6D0EF10D84F5}" sibTransId="{649EEE7D-1563-4248-929D-5CD9299F51A6}"/>
-    <dgm:cxn modelId="{7981D070-E1DA-F441-A142-C50A813AD130}" type="presOf" srcId="{9E251CFC-2A5F-6C42-99D3-BF9BD8EA3EBF}" destId="{DAB8C1E6-595B-3749-86CB-01C31DF4F5B6}" srcOrd="0" destOrd="4" presId="urn:microsoft.com/office/officeart/2005/8/layout/hList1"/>
-    <dgm:cxn modelId="{FD242F71-EE05-3744-BB89-9DE25B5B883E}" type="presOf" srcId="{730D7575-CD34-6C45-9E2D-E56BBC486051}" destId="{0ACA845D-9FC2-6344-8148-7E8CA16E5E7F}" srcOrd="0" destOrd="3" presId="urn:microsoft.com/office/officeart/2005/8/layout/hList1"/>
-    <dgm:cxn modelId="{E2D06871-2BE9-2F41-B849-B0A88E7ED468}" srcId="{63F9CB0A-1442-A443-A2CC-BDA05E7E2202}" destId="{016DAD64-638E-6240-8EF1-2E8C1B9034C7}" srcOrd="0" destOrd="0" parTransId="{DD27D5DA-3834-AB41-828E-98111BE13A1F}" sibTransId="{85689B27-C725-8E4A-A5B6-FB715F75B1B6}"/>
-    <dgm:cxn modelId="{17C6DA72-945A-DE49-901E-57CE0D6BFAD0}" srcId="{819E0C5A-1403-8E41-AAA1-DCD6DD60F058}" destId="{8FCAC36B-883B-CB49-B2A9-1726890C69CC}" srcOrd="3" destOrd="0" parTransId="{E8A03A2C-CA25-EF4D-BF6A-78335E2FE77E}" sibTransId="{D384A8A0-6BAF-884B-BCF0-7AFB8CACFA43}"/>
-    <dgm:cxn modelId="{31264873-1CCA-0944-A0B2-E46D826F39BE}" srcId="{71AAE4DF-DDA9-4949-AD48-6F122CAFD057}" destId="{89E0EB89-7578-E44F-95F9-AF1B2C0F7218}" srcOrd="3" destOrd="0" parTransId="{1EE453C3-B777-2F4F-A36B-B9FDAC3C9150}" sibTransId="{B87A37A3-39B3-B348-903D-BCECF88EB2CC}"/>
     <dgm:cxn modelId="{8B42517F-F876-9C48-9CD3-43A4A4AD6A5D}" type="presOf" srcId="{D50A149E-1F4A-7548-A154-30DBAE9D26A1}" destId="{2B6E9592-A682-6345-BF16-231F2137BE1B}" srcOrd="0" destOrd="10" presId="urn:microsoft.com/office/officeart/2005/8/layout/hList1"/>
     <dgm:cxn modelId="{68BCD77F-2039-B847-8E91-B391164CFC70}" srcId="{EE002E70-1BA6-414C-9812-44CC66DBF2F7}" destId="{E5B71C87-286A-504C-9FED-D8FBE221DF2E}" srcOrd="3" destOrd="0" parTransId="{9D8232D3-F16E-DE4A-9828-76D8F6823B26}" sibTransId="{22FC9835-6A9E-0245-9C89-EA136571E5E4}"/>
     <dgm:cxn modelId="{4C10B282-7DAF-6648-A847-A56EE0789185}" srcId="{71AAE4DF-DDA9-4949-AD48-6F122CAFD057}" destId="{0CCE534D-A193-4E48-BA6E-8D74D4A58C31}" srcOrd="4" destOrd="0" parTransId="{7BE8AED7-E6D9-E14A-95D7-BEFD8641E486}" sibTransId="{DC5B541F-E831-4E42-8982-F78C49A275C2}"/>
@@ -7267,26 +7267,26 @@
     <dgm:cxn modelId="{DE78263C-5519-0C4D-9F5E-8A21641CCE56}" type="presOf" srcId="{4DF8BBC8-0E97-4B4B-8618-619389319A3E}" destId="{0ACA845D-9FC2-6344-8148-7E8CA16E5E7F}" srcOrd="0" destOrd="5" presId="urn:microsoft.com/office/officeart/2005/8/layout/hList1"/>
     <dgm:cxn modelId="{0DCF8941-1736-0447-BC18-8F489BCE9C30}" srcId="{71AAE4DF-DDA9-4949-AD48-6F122CAFD057}" destId="{38D892D8-ED0F-6F41-B291-C9FF143724CA}" srcOrd="1" destOrd="0" parTransId="{3859C20E-5D4C-C546-BC75-63B20C1FFD6C}" sibTransId="{450E1B8C-513C-E049-9694-A8036905AB43}"/>
     <dgm:cxn modelId="{9182CE42-8264-0749-8D1B-72CF381A2FE1}" type="presOf" srcId="{ECA19826-E131-3143-8170-6FB978E3B754}" destId="{2B6E9592-A682-6345-BF16-231F2137BE1B}" srcOrd="0" destOrd="3" presId="urn:microsoft.com/office/officeart/2005/8/layout/hList1"/>
+    <dgm:cxn modelId="{DE5FED62-22E0-9847-B18B-8944F01FED78}" srcId="{71AAE4DF-DDA9-4949-AD48-6F122CAFD057}" destId="{1A8C27D0-72C6-5044-8526-797A288D9FB8}" srcOrd="7" destOrd="0" parTransId="{BF4D1E34-1730-3149-B143-4DA14F6CC138}" sibTransId="{3F1D6CBC-1C47-F240-A5D3-7F3BE51E15C7}"/>
     <dgm:cxn modelId="{AA1C1B43-00AA-CD43-BADA-3CABCF9DEA3F}" srcId="{71AAE4DF-DDA9-4949-AD48-6F122CAFD057}" destId="{DFBDC719-3909-9848-9B3E-9161F2C816B5}" srcOrd="0" destOrd="0" parTransId="{E3501F49-5B79-1A42-9160-8689D5B425AE}" sibTransId="{F9A939A6-370A-9646-A802-335EC3E76F01}"/>
     <dgm:cxn modelId="{1455AE45-EF51-E04B-9D63-6CD0F1941968}" srcId="{EE002E70-1BA6-414C-9812-44CC66DBF2F7}" destId="{B39BE120-7AA2-5844-B3DE-0FADA010FAFF}" srcOrd="6" destOrd="0" parTransId="{7B870378-EE58-894F-91E1-6AE0EF0BE966}" sibTransId="{09EB3438-EB29-9140-ACF3-893E96C366B4}"/>
+    <dgm:cxn modelId="{698E1966-86C6-2547-AC00-2FEF6A911E04}" type="presOf" srcId="{350484AC-729C-1E4F-8F60-D25F1B7D92AC}" destId="{2B6E9592-A682-6345-BF16-231F2137BE1B}" srcOrd="0" destOrd="11" presId="urn:microsoft.com/office/officeart/2005/8/layout/hList1"/>
     <dgm:cxn modelId="{11B74846-CE22-5F41-ADAE-817B401D7A78}" type="presOf" srcId="{DB8F49CC-0EAE-C943-8887-E112FC932742}" destId="{2B6E9592-A682-6345-BF16-231F2137BE1B}" srcOrd="0" destOrd="18" presId="urn:microsoft.com/office/officeart/2005/8/layout/hList1"/>
+    <dgm:cxn modelId="{FB0F6167-DA1A-8046-AF67-2950F6C79EE0}" srcId="{EE002E70-1BA6-414C-9812-44CC66DBF2F7}" destId="{EE9B25DB-61EB-1045-BC70-1F3C64B65356}" srcOrd="7" destOrd="0" parTransId="{F7053BE5-057A-1C40-8803-5A4671AC87C8}" sibTransId="{30DDA3EF-ED21-0745-811B-C8E5175528D3}"/>
     <dgm:cxn modelId="{37DB8149-1371-0C44-8E51-10B8CEA46720}" type="presOf" srcId="{BA69E4BF-DAB0-7E47-9C50-10FBF59DA58F}" destId="{0ACA845D-9FC2-6344-8148-7E8CA16E5E7F}" srcOrd="0" destOrd="6" presId="urn:microsoft.com/office/officeart/2005/8/layout/hList1"/>
     <dgm:cxn modelId="{35AC254A-D83D-5949-A175-3E4E35EB11C1}" type="presOf" srcId="{47063CA0-0CBE-7D49-B314-4F9DB3528C0B}" destId="{0ACA845D-9FC2-6344-8148-7E8CA16E5E7F}" srcOrd="0" destOrd="11" presId="urn:microsoft.com/office/officeart/2005/8/layout/hList1"/>
+    <dgm:cxn modelId="{F0A3286B-BA3C-FD4D-928F-03586CEEC86B}" srcId="{A6D7846F-3016-9146-9509-5F44F23CA934}" destId="{DB8F49CC-0EAE-C943-8887-E112FC932742}" srcOrd="0" destOrd="0" parTransId="{E3E04408-6FAC-664A-9207-A94A01C510DF}" sibTransId="{6FF47A1D-092D-9048-B35D-3C0D6759CB27}"/>
+    <dgm:cxn modelId="{CFC25A6B-9F2E-1F48-B29C-5490C5C944B0}" type="presOf" srcId="{8D2B03F3-2622-FD40-8963-81F8268332EB}" destId="{2B6E9592-A682-6345-BF16-231F2137BE1B}" srcOrd="0" destOrd="5" presId="urn:microsoft.com/office/officeart/2005/8/layout/hList1"/>
     <dgm:cxn modelId="{5A8B324C-9A73-EC43-AD3F-904C10AB887D}" srcId="{8FCAC36B-883B-CB49-B2A9-1726890C69CC}" destId="{A6D7846F-3016-9146-9509-5F44F23CA934}" srcOrd="2" destOrd="0" parTransId="{C7B8E429-BAE6-E549-A96E-B092531533E0}" sibTransId="{46DE24CA-6CE7-3D46-9E35-9921E19A126E}"/>
+    <dgm:cxn modelId="{572FEC6F-8262-404D-8F02-18EDD128C399}" srcId="{EE002E70-1BA6-414C-9812-44CC66DBF2F7}" destId="{1A5BA3FE-2D76-3845-96BA-348535CEB8D1}" srcOrd="8" destOrd="0" parTransId="{33965CB0-F7AF-C142-B4EE-6D0EF10D84F5}" sibTransId="{649EEE7D-1563-4248-929D-5CD9299F51A6}"/>
     <dgm:cxn modelId="{4A021050-6BB4-F74E-9BD3-172BBE6445EB}" type="presOf" srcId="{8FCAC36B-883B-CB49-B2A9-1726890C69CC}" destId="{F52438EA-4F92-C240-AFC6-A4B2AEE6AE1C}" srcOrd="0" destOrd="0" presId="urn:microsoft.com/office/officeart/2005/8/layout/hList1"/>
+    <dgm:cxn modelId="{17C6DA72-945A-DE49-901E-57CE0D6BFAD0}" srcId="{819E0C5A-1403-8E41-AAA1-DCD6DD60F058}" destId="{8FCAC36B-883B-CB49-B2A9-1726890C69CC}" srcOrd="0" destOrd="0" parTransId="{E8A03A2C-CA25-EF4D-BF6A-78335E2FE77E}" sibTransId="{D384A8A0-6BAF-884B-BCF0-7AFB8CACFA43}"/>
+    <dgm:cxn modelId="{31264873-1CCA-0944-A0B2-E46D826F39BE}" srcId="{71AAE4DF-DDA9-4949-AD48-6F122CAFD057}" destId="{89E0EB89-7578-E44F-95F9-AF1B2C0F7218}" srcOrd="2" destOrd="0" parTransId="{1EE453C3-B777-2F4F-A36B-B9FDAC3C9150}" sibTransId="{B87A37A3-39B3-B348-903D-BCECF88EB2CC}"/>
     <dgm:cxn modelId="{799A2054-F982-8F46-B1C0-73F1B68A7EAC}" type="presOf" srcId="{1A8C27D0-72C6-5044-8526-797A288D9FB8}" destId="{0ACA845D-9FC2-6344-8148-7E8CA16E5E7F}" srcOrd="0" destOrd="8" presId="urn:microsoft.com/office/officeart/2005/8/layout/hList1"/>
     <dgm:cxn modelId="{E8A40256-DAA7-BE47-8BA7-2A4A854BE47B}" type="presOf" srcId="{C835637C-F65B-4A4C-999A-7798918F06BA}" destId="{0ACA845D-9FC2-6344-8148-7E8CA16E5E7F}" srcOrd="0" destOrd="13" presId="urn:microsoft.com/office/officeart/2005/8/layout/hList1"/>
     <dgm:cxn modelId="{96299356-DBF7-7D4D-A130-30D7F9F1BFF4}" srcId="{71AAE4DF-DDA9-4949-AD48-6F122CAFD057}" destId="{4DF8BBC8-0E97-4B4B-8618-619389319A3E}" srcOrd="4" destOrd="0" parTransId="{6D103AB3-7690-3248-9072-663FDEDFDCB8}" sibTransId="{8CB87E1D-C919-C648-B34A-66D1E93A0CB0}"/>
     <dgm:cxn modelId="{318D0458-4882-9241-B8F1-A29B8088BB8D}" srcId="{EE002E70-1BA6-414C-9812-44CC66DBF2F7}" destId="{8F7E1E02-2D70-E04C-90D8-652953180D13}" srcOrd="13" destOrd="0" parTransId="{F80D8DF8-3180-604A-B834-4B3FB4A29CB8}" sibTransId="{93CC8377-6516-F14B-A912-AEC5AE8C1DA1}"/>
     <dgm:cxn modelId="{0C0B6A58-4CDB-DF4E-9B2F-5157383B2868}" srcId="{EE002E70-1BA6-414C-9812-44CC66DBF2F7}" destId="{ECA19826-E131-3143-8170-6FB978E3B754}" srcOrd="2" destOrd="0" parTransId="{A195020A-7C37-EB48-8F08-FC8230E32CC9}" sibTransId="{0FE27D84-46BF-8849-8331-1A5FC8DD2C73}"/>
-    <dgm:cxn modelId="{DE5FED62-22E0-9847-B18B-8944F01FED78}" srcId="{71AAE4DF-DDA9-4949-AD48-6F122CAFD057}" destId="{1A8C27D0-72C6-5044-8526-797A288D9FB8}" srcOrd="7" destOrd="0" parTransId="{BF4D1E34-1730-3149-B143-4DA14F6CC138}" sibTransId="{3F1D6CBC-1C47-F240-A5D3-7F3BE51E15C7}"/>
-    <dgm:cxn modelId="{698E1966-86C6-2547-AC00-2FEF6A911E04}" type="presOf" srcId="{350484AC-729C-1E4F-8F60-D25F1B7D92AC}" destId="{2B6E9592-A682-6345-BF16-231F2137BE1B}" srcOrd="0" destOrd="11" presId="urn:microsoft.com/office/officeart/2005/8/layout/hList1"/>
-    <dgm:cxn modelId="{FB0F6167-DA1A-8046-AF67-2950F6C79EE0}" srcId="{EE002E70-1BA6-414C-9812-44CC66DBF2F7}" destId="{EE9B25DB-61EB-1045-BC70-1F3C64B65356}" srcOrd="7" destOrd="0" parTransId="{F7053BE5-057A-1C40-8803-5A4671AC87C8}" sibTransId="{30DDA3EF-ED21-0745-811B-C8E5175528D3}"/>
-    <dgm:cxn modelId="{F0A3286B-BA3C-FD4D-928F-03586CEEC86B}" srcId="{A6D7846F-3016-9146-9509-5F44F23CA934}" destId="{DB8F49CC-0EAE-C943-8887-E112FC932742}" srcOrd="0" destOrd="0" parTransId="{E3E04408-6FAC-664A-9207-A94A01C510DF}" sibTransId="{6FF47A1D-092D-9048-B35D-3C0D6759CB27}"/>
-    <dgm:cxn modelId="{CFC25A6B-9F2E-1F48-B29C-5490C5C944B0}" type="presOf" srcId="{8D2B03F3-2622-FD40-8963-81F8268332EB}" destId="{2B6E9592-A682-6345-BF16-231F2137BE1B}" srcOrd="0" destOrd="5" presId="urn:microsoft.com/office/officeart/2005/8/layout/hList1"/>
-    <dgm:cxn modelId="{572FEC6F-8262-404D-8F02-18EDD128C399}" srcId="{EE002E70-1BA6-414C-9812-44CC66DBF2F7}" destId="{1A5BA3FE-2D76-3845-96BA-348535CEB8D1}" srcOrd="8" destOrd="0" parTransId="{33965CB0-F7AF-C142-B4EE-6D0EF10D84F5}" sibTransId="{649EEE7D-1563-4248-929D-5CD9299F51A6}"/>
-    <dgm:cxn modelId="{17C6DA72-945A-DE49-901E-57CE0D6BFAD0}" srcId="{819E0C5A-1403-8E41-AAA1-DCD6DD60F058}" destId="{8FCAC36B-883B-CB49-B2A9-1726890C69CC}" srcOrd="0" destOrd="0" parTransId="{E8A03A2C-CA25-EF4D-BF6A-78335E2FE77E}" sibTransId="{D384A8A0-6BAF-884B-BCF0-7AFB8CACFA43}"/>
-    <dgm:cxn modelId="{31264873-1CCA-0944-A0B2-E46D826F39BE}" srcId="{71AAE4DF-DDA9-4949-AD48-6F122CAFD057}" destId="{89E0EB89-7578-E44F-95F9-AF1B2C0F7218}" srcOrd="2" destOrd="0" parTransId="{1EE453C3-B777-2F4F-A36B-B9FDAC3C9150}" sibTransId="{B87A37A3-39B3-B348-903D-BCECF88EB2CC}"/>
     <dgm:cxn modelId="{8B42517F-F876-9C48-9CD3-43A4A4AD6A5D}" type="presOf" srcId="{D50A149E-1F4A-7548-A154-30DBAE9D26A1}" destId="{2B6E9592-A682-6345-BF16-231F2137BE1B}" srcOrd="0" destOrd="10" presId="urn:microsoft.com/office/officeart/2005/8/layout/hList1"/>
     <dgm:cxn modelId="{68BCD77F-2039-B847-8E91-B391164CFC70}" srcId="{EE002E70-1BA6-414C-9812-44CC66DBF2F7}" destId="{E5B71C87-286A-504C-9FED-D8FBE221DF2E}" srcOrd="3" destOrd="0" parTransId="{9D8232D3-F16E-DE4A-9828-76D8F6823B26}" sibTransId="{22FC9835-6A9E-0245-9C89-EA136571E5E4}"/>
     <dgm:cxn modelId="{D32AB586-3E01-B24B-93C4-3AA3F809C4E2}" type="presOf" srcId="{EE002E70-1BA6-414C-9812-44CC66DBF2F7}" destId="{2B6E9592-A682-6345-BF16-231F2137BE1B}" srcOrd="0" destOrd="0" presId="urn:microsoft.com/office/officeart/2005/8/layout/hList1"/>
@@ -15788,7 +15788,7 @@
           <a:p>
             <a:fld id="{73A294DA-5B1F-406C-B1D4-C938C7055EF9}" type="datetimeFigureOut">
               <a:rPr lang="es-ES" smtClean="0"/>
-              <a:t>7/1/23</a:t>
+              <a:t>07/01/2023</a:t>
             </a:fld>
             <a:endParaRPr lang="es-ES"/>
           </a:p>
@@ -15842,7 +15842,7 @@
           <a:p>
             <a:fld id="{B765FBBA-90D6-434F-9C14-208CEA536F2B}" type="slidenum">
               <a:rPr lang="es-ES" smtClean="0"/>
-              <a:t>‹Nº›</a:t>
+              <a:t>‹#›</a:t>
             </a:fld>
             <a:endParaRPr lang="es-ES"/>
           </a:p>
@@ -15988,7 +15988,7 @@
           <a:p>
             <a:fld id="{73A294DA-5B1F-406C-B1D4-C938C7055EF9}" type="datetimeFigureOut">
               <a:rPr lang="es-ES" smtClean="0"/>
-              <a:t>7/1/23</a:t>
+              <a:t>07/01/2023</a:t>
             </a:fld>
             <a:endParaRPr lang="es-ES"/>
           </a:p>
@@ -16042,7 +16042,7 @@
           <a:p>
             <a:fld id="{B765FBBA-90D6-434F-9C14-208CEA536F2B}" type="slidenum">
               <a:rPr lang="es-ES" smtClean="0"/>
-              <a:t>‹Nº›</a:t>
+              <a:t>‹#›</a:t>
             </a:fld>
             <a:endParaRPr lang="es-ES"/>
           </a:p>
@@ -16198,7 +16198,7 @@
           <a:p>
             <a:fld id="{73A294DA-5B1F-406C-B1D4-C938C7055EF9}" type="datetimeFigureOut">
               <a:rPr lang="es-ES" smtClean="0"/>
-              <a:t>7/1/23</a:t>
+              <a:t>07/01/2023</a:t>
             </a:fld>
             <a:endParaRPr lang="es-ES"/>
           </a:p>
@@ -16252,7 +16252,7 @@
           <a:p>
             <a:fld id="{B765FBBA-90D6-434F-9C14-208CEA536F2B}" type="slidenum">
               <a:rPr lang="es-ES" smtClean="0"/>
-              <a:t>‹Nº›</a:t>
+              <a:t>‹#›</a:t>
             </a:fld>
             <a:endParaRPr lang="es-ES"/>
           </a:p>
@@ -16398,7 +16398,7 @@
           <a:p>
             <a:fld id="{73A294DA-5B1F-406C-B1D4-C938C7055EF9}" type="datetimeFigureOut">
               <a:rPr lang="es-ES" smtClean="0"/>
-              <a:t>7/1/23</a:t>
+              <a:t>07/01/2023</a:t>
             </a:fld>
             <a:endParaRPr lang="es-ES"/>
           </a:p>
@@ -16452,7 +16452,7 @@
           <a:p>
             <a:fld id="{B765FBBA-90D6-434F-9C14-208CEA536F2B}" type="slidenum">
               <a:rPr lang="es-ES" smtClean="0"/>
-              <a:t>‹Nº›</a:t>
+              <a:t>‹#›</a:t>
             </a:fld>
             <a:endParaRPr lang="es-ES"/>
           </a:p>
@@ -16674,7 +16674,7 @@
           <a:p>
             <a:fld id="{73A294DA-5B1F-406C-B1D4-C938C7055EF9}" type="datetimeFigureOut">
               <a:rPr lang="es-ES" smtClean="0"/>
-              <a:t>7/1/23</a:t>
+              <a:t>07/01/2023</a:t>
             </a:fld>
             <a:endParaRPr lang="es-ES"/>
           </a:p>
@@ -16728,7 +16728,7 @@
           <a:p>
             <a:fld id="{B765FBBA-90D6-434F-9C14-208CEA536F2B}" type="slidenum">
               <a:rPr lang="es-ES" smtClean="0"/>
-              <a:t>‹Nº›</a:t>
+              <a:t>‹#›</a:t>
             </a:fld>
             <a:endParaRPr lang="es-ES"/>
           </a:p>
@@ -16942,7 +16942,7 @@
           <a:p>
             <a:fld id="{73A294DA-5B1F-406C-B1D4-C938C7055EF9}" type="datetimeFigureOut">
               <a:rPr lang="es-ES" smtClean="0"/>
-              <a:t>7/1/23</a:t>
+              <a:t>07/01/2023</a:t>
             </a:fld>
             <a:endParaRPr lang="es-ES"/>
           </a:p>
@@ -16996,7 +16996,7 @@
           <a:p>
             <a:fld id="{B765FBBA-90D6-434F-9C14-208CEA536F2B}" type="slidenum">
               <a:rPr lang="es-ES" smtClean="0"/>
-              <a:t>‹Nº›</a:t>
+              <a:t>‹#›</a:t>
             </a:fld>
             <a:endParaRPr lang="es-ES"/>
           </a:p>
@@ -17357,7 +17357,7 @@
           <a:p>
             <a:fld id="{73A294DA-5B1F-406C-B1D4-C938C7055EF9}" type="datetimeFigureOut">
               <a:rPr lang="es-ES" smtClean="0"/>
-              <a:t>7/1/23</a:t>
+              <a:t>07/01/2023</a:t>
             </a:fld>
             <a:endParaRPr lang="es-ES"/>
           </a:p>
@@ -17411,7 +17411,7 @@
           <a:p>
             <a:fld id="{B765FBBA-90D6-434F-9C14-208CEA536F2B}" type="slidenum">
               <a:rPr lang="es-ES" smtClean="0"/>
-              <a:t>‹Nº›</a:t>
+              <a:t>‹#›</a:t>
             </a:fld>
             <a:endParaRPr lang="es-ES"/>
           </a:p>
@@ -17499,7 +17499,7 @@
           <a:p>
             <a:fld id="{73A294DA-5B1F-406C-B1D4-C938C7055EF9}" type="datetimeFigureOut">
               <a:rPr lang="es-ES" smtClean="0"/>
-              <a:t>7/1/23</a:t>
+              <a:t>07/01/2023</a:t>
             </a:fld>
             <a:endParaRPr lang="es-ES"/>
           </a:p>
@@ -17553,7 +17553,7 @@
           <a:p>
             <a:fld id="{B765FBBA-90D6-434F-9C14-208CEA536F2B}" type="slidenum">
               <a:rPr lang="es-ES" smtClean="0"/>
-              <a:t>‹Nº›</a:t>
+              <a:t>‹#›</a:t>
             </a:fld>
             <a:endParaRPr lang="es-ES"/>
           </a:p>
@@ -17612,7 +17612,7 @@
           <a:p>
             <a:fld id="{73A294DA-5B1F-406C-B1D4-C938C7055EF9}" type="datetimeFigureOut">
               <a:rPr lang="es-ES" smtClean="0"/>
-              <a:t>7/1/23</a:t>
+              <a:t>07/01/2023</a:t>
             </a:fld>
             <a:endParaRPr lang="es-ES"/>
           </a:p>
@@ -17666,7 +17666,7 @@
           <a:p>
             <a:fld id="{B765FBBA-90D6-434F-9C14-208CEA536F2B}" type="slidenum">
               <a:rPr lang="es-ES" smtClean="0"/>
-              <a:t>‹Nº›</a:t>
+              <a:t>‹#›</a:t>
             </a:fld>
             <a:endParaRPr lang="es-ES"/>
           </a:p>
@@ -17925,7 +17925,7 @@
           <a:p>
             <a:fld id="{73A294DA-5B1F-406C-B1D4-C938C7055EF9}" type="datetimeFigureOut">
               <a:rPr lang="es-ES" smtClean="0"/>
-              <a:t>7/1/23</a:t>
+              <a:t>07/01/2023</a:t>
             </a:fld>
             <a:endParaRPr lang="es-ES"/>
           </a:p>
@@ -17979,7 +17979,7 @@
           <a:p>
             <a:fld id="{B765FBBA-90D6-434F-9C14-208CEA536F2B}" type="slidenum">
               <a:rPr lang="es-ES" smtClean="0"/>
-              <a:t>‹Nº›</a:t>
+              <a:t>‹#›</a:t>
             </a:fld>
             <a:endParaRPr lang="es-ES"/>
           </a:p>
@@ -18214,7 +18214,7 @@
           <a:p>
             <a:fld id="{73A294DA-5B1F-406C-B1D4-C938C7055EF9}" type="datetimeFigureOut">
               <a:rPr lang="es-ES" smtClean="0"/>
-              <a:t>7/1/23</a:t>
+              <a:t>07/01/2023</a:t>
             </a:fld>
             <a:endParaRPr lang="es-ES"/>
           </a:p>
@@ -18268,7 +18268,7 @@
           <a:p>
             <a:fld id="{B765FBBA-90D6-434F-9C14-208CEA536F2B}" type="slidenum">
               <a:rPr lang="es-ES" smtClean="0"/>
-              <a:t>‹Nº›</a:t>
+              <a:t>‹#›</a:t>
             </a:fld>
             <a:endParaRPr lang="es-ES"/>
           </a:p>
@@ -18457,7 +18457,7 @@
           <a:p>
             <a:fld id="{73A294DA-5B1F-406C-B1D4-C938C7055EF9}" type="datetimeFigureOut">
               <a:rPr lang="es-ES" smtClean="0"/>
-              <a:t>7/1/23</a:t>
+              <a:t>07/01/2023</a:t>
             </a:fld>
             <a:endParaRPr lang="es-ES"/>
           </a:p>
@@ -18547,7 +18547,7 @@
           <a:p>
             <a:fld id="{B765FBBA-90D6-434F-9C14-208CEA536F2B}" type="slidenum">
               <a:rPr lang="es-ES" smtClean="0"/>
-              <a:t>‹Nº›</a:t>
+              <a:t>‹#›</a:t>
             </a:fld>
             <a:endParaRPr lang="es-ES"/>
           </a:p>
@@ -19261,7 +19261,7 @@
         <p:spPr>
           <a:xfrm>
             <a:off x="440456" y="143702"/>
-            <a:ext cx="9559887" cy="523220"/>
+            <a:ext cx="9559887" cy="800219"/>
           </a:xfrm>
           <a:prstGeom prst="rect">
             <a:avLst/>
@@ -19283,55 +19283,15 @@
               <a:t>4. ANÁLISIS DE LOS DATOS</a:t>
             </a:r>
           </a:p>
-        </p:txBody>
-      </p:sp>
-      <p:sp>
-        <p:nvSpPr>
-          <p:cNvPr id="6" name="TextBox 5">
-            <a:extLst>
-              <a:ext uri="{FF2B5EF4-FFF2-40B4-BE49-F238E27FC236}">
-                <a16:creationId xmlns:a16="http://schemas.microsoft.com/office/drawing/2014/main" id="{1FA76770-F660-DB19-61AA-87990F00E84D}"/>
-              </a:ext>
-            </a:extLst>
-          </p:cNvPr>
-          <p:cNvSpPr txBox="1"/>
-          <p:nvPr/>
-        </p:nvSpPr>
-        <p:spPr>
-          <a:xfrm>
-            <a:off x="440456" y="798287"/>
-            <a:ext cx="10864282" cy="464871"/>
-          </a:xfrm>
-          <a:prstGeom prst="rect">
-            <a:avLst/>
-          </a:prstGeom>
-          <a:noFill/>
-        </p:spPr>
-        <p:txBody>
-          <a:bodyPr wrap="square">
-            <a:spAutoFit/>
-          </a:bodyPr>
-          <a:lstStyle/>
           <a:p>
-            <a:pPr algn="just">
-              <a:lnSpc>
-                <a:spcPct val="150000"/>
-              </a:lnSpc>
-            </a:pPr>
             <a:r>
               <a:rPr lang="es-ES" b="1" dirty="0">
                 <a:solidFill>
                   <a:srgbClr val="002060"/>
                 </a:solidFill>
               </a:rPr>
-              <a:t>Correlación con la variable objetivo</a:t>
+              <a:t>Correlación con variable objetivo y selección de los grupos de datos a analizar</a:t>
             </a:r>
-            <a:endParaRPr lang="es-ES" b="1" dirty="0">
-              <a:solidFill>
-                <a:srgbClr val="002060"/>
-              </a:solidFill>
-              <a:sym typeface="Wingdings" panose="05000000000000000000" pitchFamily="2" charset="2"/>
-            </a:endParaRPr>
           </a:p>
         </p:txBody>
       </p:sp>
@@ -19371,10 +19331,271 @@
           </a:prstGeom>
         </p:spPr>
       </p:pic>
+      <p:sp>
+        <p:nvSpPr>
+          <p:cNvPr id="2" name="TextBox 1">
+            <a:extLst>
+              <a:ext uri="{FF2B5EF4-FFF2-40B4-BE49-F238E27FC236}">
+                <a16:creationId xmlns:a16="http://schemas.microsoft.com/office/drawing/2014/main" id="{C47917D5-3D4B-1D2D-00CE-424B48A1DE2F}"/>
+              </a:ext>
+            </a:extLst>
+          </p:cNvPr>
+          <p:cNvSpPr txBox="1"/>
+          <p:nvPr/>
+        </p:nvSpPr>
+        <p:spPr>
+          <a:xfrm>
+            <a:off x="440456" y="1119073"/>
+            <a:ext cx="7498858" cy="5266185"/>
+          </a:xfrm>
+          <a:prstGeom prst="rect">
+            <a:avLst/>
+          </a:prstGeom>
+          <a:noFill/>
+        </p:spPr>
+        <p:txBody>
+          <a:bodyPr wrap="square" rtlCol="0">
+            <a:spAutoFit/>
+          </a:bodyPr>
+          <a:lstStyle/>
+          <a:p>
+            <a:pPr marL="285750" indent="-285750" algn="just">
+              <a:lnSpc>
+                <a:spcPct val="150000"/>
+              </a:lnSpc>
+              <a:buFont typeface="Arial" panose="020B0604020202020204" pitchFamily="34" charset="0"/>
+              <a:buChar char="•"/>
+            </a:pPr>
+            <a:r>
+              <a:rPr lang="es-ES" sz="1600" dirty="0">
+                <a:solidFill>
+                  <a:srgbClr val="002060"/>
+                </a:solidFill>
+              </a:rPr>
+              <a:t>En esta sección se analiza la correlación entre todas las variables mediante matrices de correlación. Hemos usado la </a:t>
+            </a:r>
+            <a:r>
+              <a:rPr lang="es-ES" sz="1600" b="1" dirty="0">
+                <a:solidFill>
+                  <a:srgbClr val="002060"/>
+                </a:solidFill>
+              </a:rPr>
+              <a:t>correlación de Spearman</a:t>
+            </a:r>
+            <a:r>
+              <a:rPr lang="es-ES" sz="1600" dirty="0">
+                <a:solidFill>
+                  <a:srgbClr val="002060"/>
+                </a:solidFill>
+              </a:rPr>
+              <a:t>, ya que no sabemos todavía si los datos se distribuyen normalmente.</a:t>
+            </a:r>
+          </a:p>
+          <a:p>
+            <a:pPr marL="285750" indent="-285750" algn="just">
+              <a:lnSpc>
+                <a:spcPct val="150000"/>
+              </a:lnSpc>
+              <a:buFont typeface="Arial" panose="020B0604020202020204" pitchFamily="34" charset="0"/>
+              <a:buChar char="•"/>
+            </a:pPr>
+            <a:r>
+              <a:rPr lang="es-ES" sz="1600" dirty="0">
+                <a:solidFill>
+                  <a:srgbClr val="002060"/>
+                </a:solidFill>
+              </a:rPr>
+              <a:t>Observamos correlaciones elevadas entre las variables de score, como es de esperar, así como entre variables relacionadas con </a:t>
+            </a:r>
+            <a:r>
+              <a:rPr lang="es-ES" sz="1600" dirty="0" err="1">
+                <a:solidFill>
+                  <a:srgbClr val="002060"/>
+                </a:solidFill>
+              </a:rPr>
+              <a:t>features</a:t>
+            </a:r>
+            <a:r>
+              <a:rPr lang="es-ES" sz="1600" dirty="0">
+                <a:solidFill>
+                  <a:srgbClr val="002060"/>
+                </a:solidFill>
+              </a:rPr>
+              <a:t> (Generalmente por la existencia de ciertos </a:t>
+            </a:r>
+            <a:r>
+              <a:rPr lang="es-ES" sz="1600" dirty="0" err="1">
+                <a:solidFill>
+                  <a:srgbClr val="002060"/>
+                </a:solidFill>
+              </a:rPr>
+              <a:t>features</a:t>
+            </a:r>
+            <a:r>
+              <a:rPr lang="es-ES" sz="1600" dirty="0">
+                <a:solidFill>
+                  <a:srgbClr val="002060"/>
+                </a:solidFill>
+              </a:rPr>
+              <a:t> en muchos hoteles). </a:t>
+            </a:r>
+            <a:r>
+              <a:rPr lang="es-ES" sz="1600" b="1" dirty="0">
+                <a:solidFill>
+                  <a:srgbClr val="002060"/>
+                </a:solidFill>
+              </a:rPr>
+              <a:t>Esta información se ha tenido en cuenta para evitar problemas de multicolinealidad.</a:t>
+            </a:r>
+          </a:p>
+          <a:p>
+            <a:pPr marL="285750" indent="-285750" algn="just">
+              <a:lnSpc>
+                <a:spcPct val="150000"/>
+              </a:lnSpc>
+              <a:buFont typeface="Arial" panose="020B0604020202020204" pitchFamily="34" charset="0"/>
+              <a:buChar char="•"/>
+            </a:pPr>
+            <a:r>
+              <a:rPr lang="es-ES" sz="1600" dirty="0">
+                <a:solidFill>
+                  <a:srgbClr val="002060"/>
+                </a:solidFill>
+              </a:rPr>
+              <a:t>Finalizando esta sección, creamos dos </a:t>
+            </a:r>
+            <a:r>
+              <a:rPr lang="es-ES" sz="1600" dirty="0" err="1">
+                <a:solidFill>
+                  <a:srgbClr val="002060"/>
+                </a:solidFill>
+              </a:rPr>
+              <a:t>dataframes</a:t>
+            </a:r>
+            <a:r>
+              <a:rPr lang="es-ES" sz="1600" dirty="0">
+                <a:solidFill>
+                  <a:srgbClr val="002060"/>
+                </a:solidFill>
+              </a:rPr>
+              <a:t> distintos para abordar los dos problemas que tratamos en este proyecto. La selección de las variables se basa en la correlación de Spearman con la variable objetivo en cada caso (otras métricas relacionadas con dependencias no lineales arrojaban los mismos resultados). </a:t>
+            </a:r>
+            <a:r>
+              <a:rPr lang="es-ES" sz="1600" dirty="0">
+                <a:solidFill>
+                  <a:srgbClr val="002060"/>
+                </a:solidFill>
+                <a:sym typeface="Wingdings" panose="05000000000000000000" pitchFamily="2" charset="2"/>
+              </a:rPr>
+              <a:t> </a:t>
+            </a:r>
+            <a:r>
+              <a:rPr lang="es-ES" sz="1600" b="1" dirty="0">
+                <a:solidFill>
+                  <a:srgbClr val="002060"/>
+                </a:solidFill>
+                <a:sym typeface="Wingdings" panose="05000000000000000000" pitchFamily="2" charset="2"/>
+              </a:rPr>
+              <a:t>Lastimosamente, no encontramos correlaciones muy elevadas entre variables independientes y variable dependiente.</a:t>
+            </a:r>
+            <a:endParaRPr lang="es-ES" sz="1600" dirty="0">
+              <a:solidFill>
+                <a:srgbClr val="002060"/>
+              </a:solidFill>
+            </a:endParaRPr>
+          </a:p>
+          <a:p>
+            <a:pPr marL="742950" lvl="1" indent="-285750" algn="just">
+              <a:lnSpc>
+                <a:spcPct val="150000"/>
+              </a:lnSpc>
+              <a:buFont typeface="Arial" panose="020B0604020202020204" pitchFamily="34" charset="0"/>
+              <a:buChar char="•"/>
+            </a:pPr>
+            <a:endParaRPr lang="es-ES" dirty="0">
+              <a:solidFill>
+                <a:srgbClr val="002060"/>
+              </a:solidFill>
+            </a:endParaRPr>
+          </a:p>
+        </p:txBody>
+      </p:sp>
+      <p:pic>
+        <p:nvPicPr>
+          <p:cNvPr id="7" name="Picture">
+            <a:extLst>
+              <a:ext uri="{FF2B5EF4-FFF2-40B4-BE49-F238E27FC236}">
+                <a16:creationId xmlns:a16="http://schemas.microsoft.com/office/drawing/2014/main" id="{6AD7172C-5D36-0ED6-10B9-A6371EF409F3}"/>
+              </a:ext>
+            </a:extLst>
+          </p:cNvPr>
+          <p:cNvPicPr/>
+          <p:nvPr/>
+        </p:nvPicPr>
+        <p:blipFill rotWithShape="1">
+          <a:blip r:embed="rId3">
+            <a:extLst>
+              <a:ext uri="{28A0092B-C50C-407E-A947-70E740481C1C}">
+                <a14:useLocalDpi xmlns:a14="http://schemas.microsoft.com/office/drawing/2010/main" val="0"/>
+              </a:ext>
+            </a:extLst>
+          </a:blip>
+          <a:srcRect l="2474" t="9536" r="10309" b="1546"/>
+          <a:stretch/>
+        </p:blipFill>
+        <p:spPr bwMode="auto">
+          <a:xfrm>
+            <a:off x="8212667" y="480373"/>
+            <a:ext cx="3850368" cy="2948627"/>
+          </a:xfrm>
+          <a:prstGeom prst="rect">
+            <a:avLst/>
+          </a:prstGeom>
+          <a:noFill/>
+          <a:ln>
+            <a:noFill/>
+          </a:ln>
+          <a:extLst>
+            <a:ext uri="{53640926-AAD7-44D8-BBD7-CCE9431645EC}">
+              <a14:shadowObscured xmlns:a14="http://schemas.microsoft.com/office/drawing/2010/main"/>
+            </a:ext>
+          </a:extLst>
+        </p:spPr>
+      </p:pic>
+      <p:pic>
+        <p:nvPicPr>
+          <p:cNvPr id="9" name="Picture 8">
+            <a:extLst>
+              <a:ext uri="{FF2B5EF4-FFF2-40B4-BE49-F238E27FC236}">
+                <a16:creationId xmlns:a16="http://schemas.microsoft.com/office/drawing/2014/main" id="{B5AAC730-0BAC-57B7-B91A-C5A41DCD01DD}"/>
+              </a:ext>
+            </a:extLst>
+          </p:cNvPr>
+          <p:cNvPicPr>
+            <a:picLocks noChangeAspect="1"/>
+          </p:cNvPicPr>
+          <p:nvPr/>
+        </p:nvPicPr>
+        <p:blipFill>
+          <a:blip r:embed="rId4"/>
+          <a:stretch>
+            <a:fillRect/>
+          </a:stretch>
+        </p:blipFill>
+        <p:spPr>
+          <a:xfrm>
+            <a:off x="8385893" y="3588686"/>
+            <a:ext cx="3503915" cy="2144428"/>
+          </a:xfrm>
+          <a:prstGeom prst="rect">
+            <a:avLst/>
+          </a:prstGeom>
+        </p:spPr>
+      </p:pic>
     </p:spTree>
     <p:extLst>
       <p:ext uri="{BB962C8B-B14F-4D97-AF65-F5344CB8AC3E}">
-        <p14:creationId xmlns:p14="http://schemas.microsoft.com/office/powerpoint/2010/main" val="2272010027"/>
+        <p14:creationId xmlns:p14="http://schemas.microsoft.com/office/powerpoint/2010/main" val="1512889017"/>
       </p:ext>
     </p:extLst>
   </p:cSld>
@@ -19416,7 +19637,7 @@
         <p:spPr>
           <a:xfrm>
             <a:off x="440456" y="143702"/>
-            <a:ext cx="9559887" cy="523220"/>
+            <a:ext cx="9559887" cy="800219"/>
           </a:xfrm>
           <a:prstGeom prst="rect">
             <a:avLst/>
@@ -19438,65 +19659,15 @@
               <a:t>4. ANÁLISIS DE LOS DATOS</a:t>
             </a:r>
           </a:p>
-        </p:txBody>
-      </p:sp>
-      <p:sp>
-        <p:nvSpPr>
-          <p:cNvPr id="6" name="TextBox 5">
-            <a:extLst>
-              <a:ext uri="{FF2B5EF4-FFF2-40B4-BE49-F238E27FC236}">
-                <a16:creationId xmlns:a16="http://schemas.microsoft.com/office/drawing/2014/main" id="{1FA76770-F660-DB19-61AA-87990F00E84D}"/>
-              </a:ext>
-            </a:extLst>
-          </p:cNvPr>
-          <p:cNvSpPr txBox="1"/>
-          <p:nvPr/>
-        </p:nvSpPr>
-        <p:spPr>
-          <a:xfrm>
-            <a:off x="440456" y="798287"/>
-            <a:ext cx="10864282" cy="464871"/>
-          </a:xfrm>
-          <a:prstGeom prst="rect">
-            <a:avLst/>
-          </a:prstGeom>
-          <a:noFill/>
-        </p:spPr>
-        <p:txBody>
-          <a:bodyPr wrap="square">
-            <a:spAutoFit/>
-          </a:bodyPr>
-          <a:lstStyle/>
           <a:p>
-            <a:pPr algn="just">
-              <a:lnSpc>
-                <a:spcPct val="150000"/>
-              </a:lnSpc>
-            </a:pPr>
             <a:r>
               <a:rPr lang="es-ES" b="1" dirty="0">
                 <a:solidFill>
                   <a:srgbClr val="002060"/>
                 </a:solidFill>
-                <a:sym typeface="Wingdings" panose="05000000000000000000" pitchFamily="2" charset="2"/>
               </a:rPr>
-              <a:t>Normalidad y </a:t>
+              <a:t>Comprobación de normalidad y homogeneidad de la varianza</a:t>
             </a:r>
-            <a:r>
-              <a:rPr lang="es-ES" b="1" dirty="0" err="1">
-                <a:solidFill>
-                  <a:srgbClr val="002060"/>
-                </a:solidFill>
-                <a:sym typeface="Wingdings" panose="05000000000000000000" pitchFamily="2" charset="2"/>
-              </a:rPr>
-              <a:t>homocedesticidad</a:t>
-            </a:r>
-            <a:endParaRPr lang="es-ES" b="1" dirty="0">
-              <a:solidFill>
-                <a:srgbClr val="002060"/>
-              </a:solidFill>
-              <a:sym typeface="Wingdings" panose="05000000000000000000" pitchFamily="2" charset="2"/>
-            </a:endParaRPr>
           </a:p>
         </p:txBody>
       </p:sp>
@@ -19536,10 +19707,360 @@
           </a:prstGeom>
         </p:spPr>
       </p:pic>
+      <p:sp>
+        <p:nvSpPr>
+          <p:cNvPr id="2" name="TextBox 1">
+            <a:extLst>
+              <a:ext uri="{FF2B5EF4-FFF2-40B4-BE49-F238E27FC236}">
+                <a16:creationId xmlns:a16="http://schemas.microsoft.com/office/drawing/2014/main" id="{CA6DAF81-2FAF-E009-4A13-853F0F376A7B}"/>
+              </a:ext>
+            </a:extLst>
+          </p:cNvPr>
+          <p:cNvSpPr txBox="1"/>
+          <p:nvPr/>
+        </p:nvSpPr>
+        <p:spPr>
+          <a:xfrm>
+            <a:off x="440456" y="1018644"/>
+            <a:ext cx="6934011" cy="5594096"/>
+          </a:xfrm>
+          <a:prstGeom prst="rect">
+            <a:avLst/>
+          </a:prstGeom>
+          <a:noFill/>
+        </p:spPr>
+        <p:txBody>
+          <a:bodyPr wrap="square" rtlCol="0">
+            <a:spAutoFit/>
+          </a:bodyPr>
+          <a:lstStyle/>
+          <a:p>
+            <a:pPr marL="285750" indent="-285750" algn="just">
+              <a:lnSpc>
+                <a:spcPct val="150000"/>
+              </a:lnSpc>
+              <a:buFont typeface="Arial" panose="020B0604020202020204" pitchFamily="34" charset="0"/>
+              <a:buChar char="•"/>
+            </a:pPr>
+            <a:r>
+              <a:rPr lang="es-ES" sz="1600" dirty="0">
+                <a:solidFill>
+                  <a:srgbClr val="002060"/>
+                </a:solidFill>
+              </a:rPr>
+              <a:t>Analizamos visualmente la normalidad de las variables continuas de los datos mediante </a:t>
+            </a:r>
+            <a:r>
+              <a:rPr lang="es-ES" sz="1600" b="1" dirty="0">
+                <a:solidFill>
+                  <a:srgbClr val="002060"/>
+                </a:solidFill>
+              </a:rPr>
+              <a:t>QQ-</a:t>
+            </a:r>
+            <a:r>
+              <a:rPr lang="es-ES" sz="1600" b="1" dirty="0" err="1">
+                <a:solidFill>
+                  <a:srgbClr val="002060"/>
+                </a:solidFill>
+              </a:rPr>
+              <a:t>Plots</a:t>
+            </a:r>
+            <a:r>
+              <a:rPr lang="es-ES" sz="1600" b="1" dirty="0">
+                <a:solidFill>
+                  <a:srgbClr val="002060"/>
+                </a:solidFill>
+              </a:rPr>
+              <a:t> y Histogramas</a:t>
+            </a:r>
+            <a:r>
+              <a:rPr lang="es-ES" sz="1600" dirty="0">
+                <a:solidFill>
+                  <a:srgbClr val="002060"/>
+                </a:solidFill>
+              </a:rPr>
+              <a:t>.</a:t>
+            </a:r>
+          </a:p>
+          <a:p>
+            <a:pPr marL="285750" indent="-285750" algn="just">
+              <a:lnSpc>
+                <a:spcPct val="150000"/>
+              </a:lnSpc>
+              <a:buFont typeface="Arial" panose="020B0604020202020204" pitchFamily="34" charset="0"/>
+              <a:buChar char="•"/>
+            </a:pPr>
+            <a:r>
+              <a:rPr lang="es-ES" sz="1600" dirty="0">
+                <a:solidFill>
+                  <a:srgbClr val="002060"/>
+                </a:solidFill>
+              </a:rPr>
+              <a:t>Analizamos la normalidad de las variables continuas mediante el test </a:t>
+            </a:r>
+            <a:r>
+              <a:rPr lang="es-ES" sz="1600" b="1" dirty="0">
+                <a:solidFill>
+                  <a:srgbClr val="002060"/>
+                </a:solidFill>
+              </a:rPr>
+              <a:t>Shapiro-Wilk.</a:t>
+            </a:r>
+          </a:p>
+          <a:p>
+            <a:pPr marL="742950" lvl="1" indent="-285750" algn="just">
+              <a:lnSpc>
+                <a:spcPct val="150000"/>
+              </a:lnSpc>
+              <a:buFont typeface="Arial" panose="020B0604020202020204" pitchFamily="34" charset="0"/>
+              <a:buChar char="•"/>
+            </a:pPr>
+            <a:r>
+              <a:rPr lang="es-ES" sz="1600" b="1" dirty="0">
+                <a:solidFill>
+                  <a:srgbClr val="002060"/>
+                </a:solidFill>
+              </a:rPr>
+              <a:t>Se prueba a transformar los datos con Box-Cox pero no se logra obtener normalidad en los datos.</a:t>
+            </a:r>
+          </a:p>
+          <a:p>
+            <a:pPr lvl="1" algn="just">
+              <a:lnSpc>
+                <a:spcPct val="150000"/>
+              </a:lnSpc>
+            </a:pPr>
+            <a:endParaRPr lang="es-ES" sz="1600" dirty="0">
+              <a:solidFill>
+                <a:srgbClr val="002060"/>
+              </a:solidFill>
+            </a:endParaRPr>
+          </a:p>
+          <a:p>
+            <a:pPr marL="285750" indent="-285750" algn="just">
+              <a:lnSpc>
+                <a:spcPct val="150000"/>
+              </a:lnSpc>
+              <a:buFont typeface="Arial" panose="020B0604020202020204" pitchFamily="34" charset="0"/>
+              <a:buChar char="•"/>
+            </a:pPr>
+            <a:r>
+              <a:rPr lang="es-ES" sz="1600" dirty="0">
+                <a:solidFill>
+                  <a:srgbClr val="002060"/>
+                </a:solidFill>
+              </a:rPr>
+              <a:t>Analizamos visualmente la homogeneidad de varianzas mediante </a:t>
+            </a:r>
+            <a:r>
+              <a:rPr lang="es-ES" sz="1600" dirty="0" err="1">
+                <a:solidFill>
+                  <a:srgbClr val="002060"/>
+                </a:solidFill>
+              </a:rPr>
+              <a:t>scatter</a:t>
+            </a:r>
+            <a:r>
+              <a:rPr lang="es-ES" sz="1600" dirty="0">
+                <a:solidFill>
+                  <a:srgbClr val="002060"/>
+                </a:solidFill>
+              </a:rPr>
+              <a:t> </a:t>
+            </a:r>
+            <a:r>
+              <a:rPr lang="es-ES" sz="1600" dirty="0" err="1">
+                <a:solidFill>
+                  <a:srgbClr val="002060"/>
+                </a:solidFill>
+              </a:rPr>
+              <a:t>plots</a:t>
+            </a:r>
+            <a:r>
+              <a:rPr lang="es-ES" sz="1600" dirty="0">
+                <a:solidFill>
+                  <a:srgbClr val="002060"/>
+                </a:solidFill>
+              </a:rPr>
+              <a:t>.</a:t>
+            </a:r>
+          </a:p>
+          <a:p>
+            <a:pPr marL="285750" indent="-285750" algn="just">
+              <a:lnSpc>
+                <a:spcPct val="150000"/>
+              </a:lnSpc>
+              <a:buFont typeface="Arial" panose="020B0604020202020204" pitchFamily="34" charset="0"/>
+              <a:buChar char="•"/>
+            </a:pPr>
+            <a:r>
+              <a:rPr lang="es-ES" sz="1600" dirty="0">
+                <a:solidFill>
+                  <a:srgbClr val="002060"/>
+                </a:solidFill>
+              </a:rPr>
+              <a:t>Analizamos la </a:t>
+            </a:r>
+            <a:r>
+              <a:rPr lang="es-ES" sz="1600" dirty="0" err="1">
+                <a:solidFill>
+                  <a:srgbClr val="002060"/>
+                </a:solidFill>
+              </a:rPr>
+              <a:t>homocesdasticidad</a:t>
+            </a:r>
+            <a:r>
+              <a:rPr lang="es-ES" sz="1600" dirty="0">
+                <a:solidFill>
+                  <a:srgbClr val="002060"/>
+                </a:solidFill>
+              </a:rPr>
+              <a:t> mediante el test no paramétrico </a:t>
+            </a:r>
+            <a:r>
+              <a:rPr lang="es-ES" sz="1600" dirty="0" err="1">
+                <a:solidFill>
+                  <a:srgbClr val="002060"/>
+                </a:solidFill>
+              </a:rPr>
+              <a:t>Fligner-Killeen</a:t>
+            </a:r>
+            <a:r>
+              <a:rPr lang="es-ES" sz="1600" dirty="0">
+                <a:solidFill>
+                  <a:srgbClr val="002060"/>
+                </a:solidFill>
+              </a:rPr>
+              <a:t> dada la no normalidad de los datos.</a:t>
+            </a:r>
+          </a:p>
+          <a:p>
+            <a:pPr marL="285750" indent="-285750" algn="just">
+              <a:lnSpc>
+                <a:spcPct val="150000"/>
+              </a:lnSpc>
+              <a:buFont typeface="Arial" panose="020B0604020202020204" pitchFamily="34" charset="0"/>
+              <a:buChar char="•"/>
+            </a:pPr>
+            <a:endParaRPr lang="es-ES" sz="1600" dirty="0">
+              <a:solidFill>
+                <a:srgbClr val="002060"/>
+              </a:solidFill>
+            </a:endParaRPr>
+          </a:p>
+          <a:p>
+            <a:pPr algn="just">
+              <a:lnSpc>
+                <a:spcPct val="150000"/>
+              </a:lnSpc>
+            </a:pPr>
+            <a:r>
+              <a:rPr lang="es-ES" sz="1600" b="1" dirty="0">
+                <a:solidFill>
+                  <a:srgbClr val="002060"/>
+                </a:solidFill>
+              </a:rPr>
+              <a:t>Conclusiones: </a:t>
+            </a:r>
+            <a:r>
+              <a:rPr lang="es-ES" sz="1600" dirty="0">
+                <a:solidFill>
+                  <a:srgbClr val="002060"/>
+                </a:solidFill>
+              </a:rPr>
+              <a:t>Ninguna de las variables analizadas se aproxima a una distribución normal. Por otro lado no encontramos problemas de heterocedasticidad (homogeneidad de varianzas en todos los datos analizados).</a:t>
+            </a:r>
+            <a:endParaRPr lang="es-ES" sz="1600" b="1" dirty="0">
+              <a:solidFill>
+                <a:srgbClr val="002060"/>
+              </a:solidFill>
+            </a:endParaRPr>
+          </a:p>
+        </p:txBody>
+      </p:sp>
+      <p:pic>
+        <p:nvPicPr>
+          <p:cNvPr id="3" name="Picture 2" descr="Chart, histogram&#10;&#10;Description automatically generated">
+            <a:extLst>
+              <a:ext uri="{FF2B5EF4-FFF2-40B4-BE49-F238E27FC236}">
+                <a16:creationId xmlns:a16="http://schemas.microsoft.com/office/drawing/2014/main" id="{9C462BD8-5A34-CD04-45D8-C0AB5954495F}"/>
+              </a:ext>
+            </a:extLst>
+          </p:cNvPr>
+          <p:cNvPicPr>
+            <a:picLocks noChangeAspect="1"/>
+          </p:cNvPicPr>
+          <p:nvPr/>
+        </p:nvPicPr>
+        <p:blipFill>
+          <a:blip r:embed="rId3">
+            <a:extLst>
+              <a:ext uri="{28A0092B-C50C-407E-A947-70E740481C1C}">
+                <a14:useLocalDpi xmlns:a14="http://schemas.microsoft.com/office/drawing/2010/main" val="0"/>
+              </a:ext>
+            </a:extLst>
+          </a:blip>
+          <a:stretch>
+            <a:fillRect/>
+          </a:stretch>
+        </p:blipFill>
+        <p:spPr>
+          <a:xfrm>
+            <a:off x="7696199" y="514060"/>
+            <a:ext cx="4265235" cy="3025007"/>
+          </a:xfrm>
+          <a:prstGeom prst="rect">
+            <a:avLst/>
+          </a:prstGeom>
+        </p:spPr>
+      </p:pic>
+      <p:pic>
+        <p:nvPicPr>
+          <p:cNvPr id="6" name="Picture" descr="Chart, scatter chart&#10;&#10;Description automatically generated">
+            <a:extLst>
+              <a:ext uri="{FF2B5EF4-FFF2-40B4-BE49-F238E27FC236}">
+                <a16:creationId xmlns:a16="http://schemas.microsoft.com/office/drawing/2014/main" id="{341E977A-8160-2A8F-9956-250864F8C71A}"/>
+              </a:ext>
+            </a:extLst>
+          </p:cNvPr>
+          <p:cNvPicPr/>
+          <p:nvPr/>
+        </p:nvPicPr>
+        <p:blipFill rotWithShape="1">
+          <a:blip r:embed="rId4">
+            <a:extLst>
+              <a:ext uri="{28A0092B-C50C-407E-A947-70E740481C1C}">
+                <a14:useLocalDpi xmlns:a14="http://schemas.microsoft.com/office/drawing/2010/main" val="0"/>
+              </a:ext>
+            </a:extLst>
+          </a:blip>
+          <a:srcRect b="1639"/>
+          <a:stretch/>
+        </p:blipFill>
+        <p:spPr bwMode="auto">
+          <a:xfrm>
+            <a:off x="7696199" y="3648651"/>
+            <a:ext cx="4265235" cy="2309554"/>
+          </a:xfrm>
+          <a:prstGeom prst="rect">
+            <a:avLst/>
+          </a:prstGeom>
+          <a:noFill/>
+          <a:ln>
+            <a:noFill/>
+          </a:ln>
+          <a:extLst>
+            <a:ext uri="{53640926-AAD7-44D8-BBD7-CCE9431645EC}">
+              <a14:shadowObscured xmlns:a14="http://schemas.microsoft.com/office/drawing/2010/main"/>
+            </a:ext>
+          </a:extLst>
+        </p:spPr>
+      </p:pic>
     </p:spTree>
     <p:extLst>
       <p:ext uri="{BB962C8B-B14F-4D97-AF65-F5344CB8AC3E}">
-        <p14:creationId xmlns:p14="http://schemas.microsoft.com/office/powerpoint/2010/main" val="1116935007"/>
+        <p14:creationId xmlns:p14="http://schemas.microsoft.com/office/powerpoint/2010/main" val="2806910417"/>
       </p:ext>
     </p:extLst>
   </p:cSld>
@@ -22624,7 +23145,7 @@
         </p:nvSpPr>
         <p:spPr>
           <a:xfrm>
-            <a:off x="440456" y="666922"/>
+            <a:off x="430442" y="997122"/>
             <a:ext cx="10864282" cy="4549964"/>
           </a:xfrm>
           <a:prstGeom prst="rect">
@@ -23387,7 +23908,7 @@
     </p:spTree>
     <p:extLst>
       <p:ext uri="{BB962C8B-B14F-4D97-AF65-F5344CB8AC3E}">
-        <p14:creationId xmlns:p14="http://schemas.microsoft.com/office/powerpoint/2010/main" val="2228874166"/>
+        <p14:creationId xmlns:p14="http://schemas.microsoft.com/office/powerpoint/2010/main" val="3967463015"/>
       </p:ext>
     </p:extLst>
   </p:cSld>
@@ -23462,13 +23983,7 @@
           <p:cNvGraphicFramePr>
             <a:graphicFrameLocks noGrp="1"/>
           </p:cNvGraphicFramePr>
-          <p:nvPr>
-            <p:extLst>
-              <p:ext uri="{D42A27DB-BD31-4B8C-83A1-F6EECF244321}">
-                <p14:modId xmlns:p14="http://schemas.microsoft.com/office/powerpoint/2010/main" val="3594703767"/>
-              </p:ext>
-            </p:extLst>
-          </p:nvPr>
+          <p:nvPr/>
         </p:nvGraphicFramePr>
         <p:xfrm>
           <a:off x="262737" y="666922"/>
@@ -25872,7 +26387,7 @@
     </p:spTree>
     <p:extLst>
       <p:ext uri="{BB962C8B-B14F-4D97-AF65-F5344CB8AC3E}">
-        <p14:creationId xmlns:p14="http://schemas.microsoft.com/office/powerpoint/2010/main" val="2182569502"/>
+        <p14:creationId xmlns:p14="http://schemas.microsoft.com/office/powerpoint/2010/main" val="2187573410"/>
       </p:ext>
     </p:extLst>
   </p:cSld>
@@ -26261,7 +26776,7 @@
     </p:spTree>
     <p:extLst>
       <p:ext uri="{BB962C8B-B14F-4D97-AF65-F5344CB8AC3E}">
-        <p14:creationId xmlns:p14="http://schemas.microsoft.com/office/powerpoint/2010/main" val="535151621"/>
+        <p14:creationId xmlns:p14="http://schemas.microsoft.com/office/powerpoint/2010/main" val="2403070456"/>
       </p:ext>
     </p:extLst>
   </p:cSld>
@@ -26368,7 +26883,7 @@
                   <a:srgbClr val="002060"/>
                 </a:solidFill>
               </a:rPr>
-              <a:t>2.1 Transformación de las variables en el formato adecuado</a:t>
+              <a:t>Transformación de las variables en el formato adecuado</a:t>
             </a:r>
             <a:endParaRPr lang="es-ES" sz="1600" b="1" dirty="0">
               <a:solidFill>
@@ -26742,7 +27257,7 @@
     </p:spTree>
     <p:extLst>
       <p:ext uri="{BB962C8B-B14F-4D97-AF65-F5344CB8AC3E}">
-        <p14:creationId xmlns:p14="http://schemas.microsoft.com/office/powerpoint/2010/main" val="4162112996"/>
+        <p14:creationId xmlns:p14="http://schemas.microsoft.com/office/powerpoint/2010/main" val="1513452804"/>
       </p:ext>
     </p:extLst>
   </p:cSld>
@@ -26834,7 +27349,7 @@
           <a:lstStyle/>
           <a:p>
             <a:r>
-              <a:rPr lang="es-ES" sz="2800" b="1">
+              <a:rPr lang="es-ES" sz="2800" b="1" dirty="0">
                 <a:solidFill>
                   <a:srgbClr val="002060"/>
                 </a:solidFill>
@@ -26844,12 +27359,12 @@
           </a:p>
           <a:p>
             <a:r>
-              <a:rPr lang="es-ES" b="1">
+              <a:rPr lang="es-ES" b="1" dirty="0">
                 <a:solidFill>
                   <a:srgbClr val="002060"/>
                 </a:solidFill>
               </a:rPr>
-              <a:t>2.2 Tratamiento de ceros y elementos vacíos</a:t>
+              <a:t>Tratamiento de ceros y elementos vacíos</a:t>
             </a:r>
             <a:endParaRPr lang="es-ES" sz="1600" b="1" dirty="0">
               <a:solidFill>
@@ -27262,7 +27777,7 @@
     </p:spTree>
     <p:extLst>
       <p:ext uri="{BB962C8B-B14F-4D97-AF65-F5344CB8AC3E}">
-        <p14:creationId xmlns:p14="http://schemas.microsoft.com/office/powerpoint/2010/main" val="2920874984"/>
+        <p14:creationId xmlns:p14="http://schemas.microsoft.com/office/powerpoint/2010/main" val="3058205670"/>
       </p:ext>
     </p:extLst>
   </p:cSld>
@@ -27333,7 +27848,7 @@
                   <a:srgbClr val="002060"/>
                 </a:solidFill>
               </a:rPr>
-              <a:t>2.3 Tratamiento de valores extremos</a:t>
+              <a:t>Tratamiento de valores extremos</a:t>
             </a:r>
             <a:endParaRPr lang="es-ES" sz="1600" b="1" dirty="0">
               <a:solidFill>
@@ -27607,7 +28122,7 @@
     </p:spTree>
     <p:extLst>
       <p:ext uri="{BB962C8B-B14F-4D97-AF65-F5344CB8AC3E}">
-        <p14:creationId xmlns:p14="http://schemas.microsoft.com/office/powerpoint/2010/main" val="2935635008"/>
+        <p14:creationId xmlns:p14="http://schemas.microsoft.com/office/powerpoint/2010/main" val="3408654474"/>
       </p:ext>
     </p:extLst>
   </p:cSld>
@@ -27673,56 +28188,6 @@
           </a:p>
         </p:txBody>
       </p:sp>
-      <p:sp>
-        <p:nvSpPr>
-          <p:cNvPr id="6" name="TextBox 5">
-            <a:extLst>
-              <a:ext uri="{FF2B5EF4-FFF2-40B4-BE49-F238E27FC236}">
-                <a16:creationId xmlns:a16="http://schemas.microsoft.com/office/drawing/2014/main" id="{1FA76770-F660-DB19-61AA-87990F00E84D}"/>
-              </a:ext>
-            </a:extLst>
-          </p:cNvPr>
-          <p:cNvSpPr txBox="1"/>
-          <p:nvPr/>
-        </p:nvSpPr>
-        <p:spPr>
-          <a:xfrm>
-            <a:off x="440456" y="1088573"/>
-            <a:ext cx="10864282" cy="464871"/>
-          </a:xfrm>
-          <a:prstGeom prst="rect">
-            <a:avLst/>
-          </a:prstGeom>
-          <a:noFill/>
-        </p:spPr>
-        <p:txBody>
-          <a:bodyPr wrap="square">
-            <a:spAutoFit/>
-          </a:bodyPr>
-          <a:lstStyle/>
-          <a:p>
-            <a:pPr algn="just">
-              <a:lnSpc>
-                <a:spcPct val="150000"/>
-              </a:lnSpc>
-            </a:pPr>
-            <a:r>
-              <a:rPr lang="es-ES" b="1" dirty="0">
-                <a:solidFill>
-                  <a:srgbClr val="002060"/>
-                </a:solidFill>
-              </a:rPr>
-              <a:t>DATOS DE VUELOS</a:t>
-            </a:r>
-            <a:endParaRPr lang="es-ES" b="1" dirty="0">
-              <a:solidFill>
-                <a:srgbClr val="002060"/>
-              </a:solidFill>
-              <a:sym typeface="Wingdings" panose="05000000000000000000" pitchFamily="2" charset="2"/>
-            </a:endParaRPr>
-          </a:p>
-        </p:txBody>
-      </p:sp>
       <p:pic>
         <p:nvPicPr>
           <p:cNvPr id="5" name="Picture 4" descr="Graphical user interface, text, application, chat or text message&#10;&#10;Description automatically generated">
@@ -27753,6 +28218,176 @@
           <a:xfrm>
             <a:off x="10526413" y="5892800"/>
             <a:ext cx="1536622" cy="965200"/>
+          </a:xfrm>
+          <a:prstGeom prst="rect">
+            <a:avLst/>
+          </a:prstGeom>
+        </p:spPr>
+      </p:pic>
+      <p:sp>
+        <p:nvSpPr>
+          <p:cNvPr id="2" name="TextBox 1">
+            <a:extLst>
+              <a:ext uri="{FF2B5EF4-FFF2-40B4-BE49-F238E27FC236}">
+                <a16:creationId xmlns:a16="http://schemas.microsoft.com/office/drawing/2014/main" id="{D66B18E9-923E-C740-6E77-E7F7A3551AF2}"/>
+              </a:ext>
+            </a:extLst>
+          </p:cNvPr>
+          <p:cNvSpPr txBox="1"/>
+          <p:nvPr/>
+        </p:nvSpPr>
+        <p:spPr>
+          <a:xfrm>
+            <a:off x="440456" y="1235188"/>
+            <a:ext cx="10779087" cy="3615733"/>
+          </a:xfrm>
+          <a:prstGeom prst="rect">
+            <a:avLst/>
+          </a:prstGeom>
+          <a:noFill/>
+        </p:spPr>
+        <p:txBody>
+          <a:bodyPr wrap="square" rtlCol="0">
+            <a:spAutoFit/>
+          </a:bodyPr>
+          <a:lstStyle/>
+          <a:p>
+            <a:pPr marL="285750" indent="-285750" algn="just">
+              <a:lnSpc>
+                <a:spcPct val="150000"/>
+              </a:lnSpc>
+              <a:buFont typeface="Arial" panose="020B0604020202020204" pitchFamily="34" charset="0"/>
+              <a:buChar char="•"/>
+            </a:pPr>
+            <a:r>
+              <a:rPr lang="es-ES" dirty="0">
+                <a:solidFill>
+                  <a:srgbClr val="002060"/>
+                </a:solidFill>
+              </a:rPr>
+              <a:t>La selección ha sido movida después de la limpieza de los datos </a:t>
+            </a:r>
+            <a:r>
+              <a:rPr lang="es-ES" dirty="0">
+                <a:solidFill>
+                  <a:srgbClr val="002060"/>
+                </a:solidFill>
+                <a:sym typeface="Wingdings" panose="05000000000000000000" pitchFamily="2" charset="2"/>
+              </a:rPr>
+              <a:t> Muchas variables han sido utilizadas para extraer la información útil que poseen  Ahora dichas variables se desechan junto con otras de poca utilidad.</a:t>
+            </a:r>
+          </a:p>
+          <a:p>
+            <a:pPr marL="285750" indent="-285750" algn="just">
+              <a:lnSpc>
+                <a:spcPct val="150000"/>
+              </a:lnSpc>
+              <a:buFont typeface="Arial" panose="020B0604020202020204" pitchFamily="34" charset="0"/>
+              <a:buChar char="•"/>
+            </a:pPr>
+            <a:endParaRPr lang="es-ES" sz="1050" dirty="0">
+              <a:solidFill>
+                <a:srgbClr val="002060"/>
+              </a:solidFill>
+              <a:sym typeface="Wingdings" panose="05000000000000000000" pitchFamily="2" charset="2"/>
+            </a:endParaRPr>
+          </a:p>
+          <a:p>
+            <a:pPr marL="285750" indent="-285750" algn="just">
+              <a:lnSpc>
+                <a:spcPct val="150000"/>
+              </a:lnSpc>
+              <a:buFont typeface="Arial" panose="020B0604020202020204" pitchFamily="34" charset="0"/>
+              <a:buChar char="•"/>
+            </a:pPr>
+            <a:r>
+              <a:rPr lang="es-ES" dirty="0">
+                <a:solidFill>
+                  <a:srgbClr val="002060"/>
+                </a:solidFill>
+              </a:rPr>
+              <a:t>Como parte de integración hemos decidido introducir datos sobre el número de vuelos medio por mes (datos extraídos de Eurostat) por distintas razones:</a:t>
+            </a:r>
+          </a:p>
+          <a:p>
+            <a:pPr marL="742950" lvl="1" indent="-285750" algn="just">
+              <a:lnSpc>
+                <a:spcPct val="150000"/>
+              </a:lnSpc>
+              <a:buFont typeface="Arial" panose="020B0604020202020204" pitchFamily="34" charset="0"/>
+              <a:buChar char="•"/>
+            </a:pPr>
+            <a:r>
+              <a:rPr lang="es-ES" dirty="0">
+                <a:solidFill>
+                  <a:srgbClr val="002060"/>
+                </a:solidFill>
+              </a:rPr>
+              <a:t>Más vuelos podría aumentar la búsqueda de hoteles cercanos al aeropuerto.</a:t>
+            </a:r>
+          </a:p>
+          <a:p>
+            <a:pPr marL="742950" lvl="1" indent="-285750" algn="just">
+              <a:lnSpc>
+                <a:spcPct val="150000"/>
+              </a:lnSpc>
+              <a:buFont typeface="Arial" panose="020B0604020202020204" pitchFamily="34" charset="0"/>
+              <a:buChar char="•"/>
+            </a:pPr>
+            <a:r>
+              <a:rPr lang="es-ES" dirty="0">
+                <a:solidFill>
+                  <a:srgbClr val="002060"/>
+                </a:solidFill>
+              </a:rPr>
+              <a:t>Más vuelos equivale a más turismo, lo cual influye tanto en la fijación de precios de los hoteles como sus estrategias para mejorar su posicionamiento en los buscadores.</a:t>
+            </a:r>
+          </a:p>
+          <a:p>
+            <a:pPr marL="742950" lvl="1" indent="-285750" algn="just">
+              <a:lnSpc>
+                <a:spcPct val="150000"/>
+              </a:lnSpc>
+              <a:buFont typeface="Arial" panose="020B0604020202020204" pitchFamily="34" charset="0"/>
+              <a:buChar char="•"/>
+            </a:pPr>
+            <a:endParaRPr lang="es-ES" dirty="0">
+              <a:solidFill>
+                <a:srgbClr val="002060"/>
+              </a:solidFill>
+            </a:endParaRPr>
+          </a:p>
+        </p:txBody>
+      </p:sp>
+      <p:pic>
+        <p:nvPicPr>
+          <p:cNvPr id="7" name="Picture 6" descr="Logo&#10;&#10;Description automatically generated">
+            <a:extLst>
+              <a:ext uri="{FF2B5EF4-FFF2-40B4-BE49-F238E27FC236}">
+                <a16:creationId xmlns:a16="http://schemas.microsoft.com/office/drawing/2014/main" id="{955259D0-EF02-5E99-ECC3-4DC5102B7C0A}"/>
+              </a:ext>
+            </a:extLst>
+          </p:cNvPr>
+          <p:cNvPicPr>
+            <a:picLocks noChangeAspect="1"/>
+          </p:cNvPicPr>
+          <p:nvPr/>
+        </p:nvPicPr>
+        <p:blipFill rotWithShape="1">
+          <a:blip r:embed="rId3">
+            <a:extLst>
+              <a:ext uri="{28A0092B-C50C-407E-A947-70E740481C1C}">
+                <a14:useLocalDpi xmlns:a14="http://schemas.microsoft.com/office/drawing/2010/main" val="0"/>
+              </a:ext>
+            </a:extLst>
+          </a:blip>
+          <a:srcRect t="27517" b="36674"/>
+          <a:stretch/>
+        </p:blipFill>
+        <p:spPr>
+          <a:xfrm>
+            <a:off x="2859027" y="5091193"/>
+            <a:ext cx="5370573" cy="974386"/>
           </a:xfrm>
           <a:prstGeom prst="rect">
             <a:avLst/>

</xml_diff>

<commit_message>
Finishing with Memoria and Markdown
</commit_message>
<xml_diff>
--- a/Memoria_pres.pptx
+++ b/Memoria_pres.pptx
@@ -15788,7 +15788,7 @@
           <a:p>
             <a:fld id="{73A294DA-5B1F-406C-B1D4-C938C7055EF9}" type="datetimeFigureOut">
               <a:rPr lang="es-ES" smtClean="0"/>
-              <a:t>07/01/2023</a:t>
+              <a:t>08/01/2023</a:t>
             </a:fld>
             <a:endParaRPr lang="es-ES"/>
           </a:p>
@@ -15988,7 +15988,7 @@
           <a:p>
             <a:fld id="{73A294DA-5B1F-406C-B1D4-C938C7055EF9}" type="datetimeFigureOut">
               <a:rPr lang="es-ES" smtClean="0"/>
-              <a:t>07/01/2023</a:t>
+              <a:t>08/01/2023</a:t>
             </a:fld>
             <a:endParaRPr lang="es-ES"/>
           </a:p>
@@ -16198,7 +16198,7 @@
           <a:p>
             <a:fld id="{73A294DA-5B1F-406C-B1D4-C938C7055EF9}" type="datetimeFigureOut">
               <a:rPr lang="es-ES" smtClean="0"/>
-              <a:t>07/01/2023</a:t>
+              <a:t>08/01/2023</a:t>
             </a:fld>
             <a:endParaRPr lang="es-ES"/>
           </a:p>
@@ -16398,7 +16398,7 @@
           <a:p>
             <a:fld id="{73A294DA-5B1F-406C-B1D4-C938C7055EF9}" type="datetimeFigureOut">
               <a:rPr lang="es-ES" smtClean="0"/>
-              <a:t>07/01/2023</a:t>
+              <a:t>08/01/2023</a:t>
             </a:fld>
             <a:endParaRPr lang="es-ES"/>
           </a:p>
@@ -16674,7 +16674,7 @@
           <a:p>
             <a:fld id="{73A294DA-5B1F-406C-B1D4-C938C7055EF9}" type="datetimeFigureOut">
               <a:rPr lang="es-ES" smtClean="0"/>
-              <a:t>07/01/2023</a:t>
+              <a:t>08/01/2023</a:t>
             </a:fld>
             <a:endParaRPr lang="es-ES"/>
           </a:p>
@@ -16942,7 +16942,7 @@
           <a:p>
             <a:fld id="{73A294DA-5B1F-406C-B1D4-C938C7055EF9}" type="datetimeFigureOut">
               <a:rPr lang="es-ES" smtClean="0"/>
-              <a:t>07/01/2023</a:t>
+              <a:t>08/01/2023</a:t>
             </a:fld>
             <a:endParaRPr lang="es-ES"/>
           </a:p>
@@ -17357,7 +17357,7 @@
           <a:p>
             <a:fld id="{73A294DA-5B1F-406C-B1D4-C938C7055EF9}" type="datetimeFigureOut">
               <a:rPr lang="es-ES" smtClean="0"/>
-              <a:t>07/01/2023</a:t>
+              <a:t>08/01/2023</a:t>
             </a:fld>
             <a:endParaRPr lang="es-ES"/>
           </a:p>
@@ -17499,7 +17499,7 @@
           <a:p>
             <a:fld id="{73A294DA-5B1F-406C-B1D4-C938C7055EF9}" type="datetimeFigureOut">
               <a:rPr lang="es-ES" smtClean="0"/>
-              <a:t>07/01/2023</a:t>
+              <a:t>08/01/2023</a:t>
             </a:fld>
             <a:endParaRPr lang="es-ES"/>
           </a:p>
@@ -17612,7 +17612,7 @@
           <a:p>
             <a:fld id="{73A294DA-5B1F-406C-B1D4-C938C7055EF9}" type="datetimeFigureOut">
               <a:rPr lang="es-ES" smtClean="0"/>
-              <a:t>07/01/2023</a:t>
+              <a:t>08/01/2023</a:t>
             </a:fld>
             <a:endParaRPr lang="es-ES"/>
           </a:p>
@@ -17925,7 +17925,7 @@
           <a:p>
             <a:fld id="{73A294DA-5B1F-406C-B1D4-C938C7055EF9}" type="datetimeFigureOut">
               <a:rPr lang="es-ES" smtClean="0"/>
-              <a:t>07/01/2023</a:t>
+              <a:t>08/01/2023</a:t>
             </a:fld>
             <a:endParaRPr lang="es-ES"/>
           </a:p>
@@ -18214,7 +18214,7 @@
           <a:p>
             <a:fld id="{73A294DA-5B1F-406C-B1D4-C938C7055EF9}" type="datetimeFigureOut">
               <a:rPr lang="es-ES" smtClean="0"/>
-              <a:t>07/01/2023</a:t>
+              <a:t>08/01/2023</a:t>
             </a:fld>
             <a:endParaRPr lang="es-ES"/>
           </a:p>
@@ -18457,7 +18457,7 @@
           <a:p>
             <a:fld id="{73A294DA-5B1F-406C-B1D4-C938C7055EF9}" type="datetimeFigureOut">
               <a:rPr lang="es-ES" smtClean="0"/>
-              <a:t>07/01/2023</a:t>
+              <a:t>08/01/2023</a:t>
             </a:fld>
             <a:endParaRPr lang="es-ES"/>
           </a:p>
@@ -23761,8 +23761,8 @@
         </p:nvSpPr>
         <p:spPr>
           <a:xfrm>
-            <a:off x="434410" y="1557571"/>
-            <a:ext cx="5162057" cy="4619854"/>
+            <a:off x="338667" y="1978485"/>
+            <a:ext cx="5162057" cy="3373359"/>
           </a:xfrm>
           <a:prstGeom prst="rect">
             <a:avLst/>
@@ -23783,20 +23783,12 @@
               <a:buChar char="•"/>
             </a:pPr>
             <a:r>
-              <a:rPr lang="es-ES" dirty="0">
-                <a:solidFill>
-                  <a:srgbClr val="002060"/>
-                </a:solidFill>
-              </a:rPr>
-              <a:t>El conjunto de datos a tratar es el obtenido como resultado de la práctica anterior de Web </a:t>
-            </a:r>
-            <a:r>
               <a:rPr lang="es-ES" dirty="0" err="1">
                 <a:solidFill>
                   <a:srgbClr val="002060"/>
                 </a:solidFill>
               </a:rPr>
-              <a:t>Scraping</a:t>
+              <a:t>Dataset</a:t>
             </a:r>
             <a:r>
               <a:rPr lang="es-ES" dirty="0">
@@ -23804,7 +23796,7 @@
                   <a:srgbClr val="002060"/>
                 </a:solidFill>
               </a:rPr>
-              <a:t>.</a:t>
+              <a:t> obtenido de la Práctica 1.</a:t>
             </a:r>
           </a:p>
           <a:p>
@@ -23837,7 +23829,7 @@
                   <a:srgbClr val="002060"/>
                 </a:solidFill>
               </a:rPr>
-              <a:t> contiene los datos e indicadores más relevantes de cada uno de los hoteles encontrados en función de determinados criterios de búsqueda.</a:t>
+              <a:t> contiene los datos e indicadores más relevantes de cada uno de los hoteles encontrados:</a:t>
             </a:r>
           </a:p>
           <a:p>
@@ -23854,23 +23846,7 @@
                   <a:srgbClr val="002060"/>
                 </a:solidFill>
               </a:rPr>
-              <a:t>En concreto, en el </a:t>
-            </a:r>
-            <a:r>
-              <a:rPr lang="es-ES" dirty="0" err="1">
-                <a:solidFill>
-                  <a:srgbClr val="002060"/>
-                </a:solidFill>
-              </a:rPr>
-              <a:t>dataset</a:t>
-            </a:r>
-            <a:r>
-              <a:rPr lang="es-ES" dirty="0">
-                <a:solidFill>
-                  <a:srgbClr val="002060"/>
-                </a:solidFill>
-              </a:rPr>
-              <a:t> encontramos datos de habitaciones para tres ciudades distintas (Barcelona, Madrid y Valencia) en tres meses distintos (Diciembre, Marzo y Junio).</a:t>
+              <a:t>Datos de habitaciones para tres ciudades distintas (Barcelona, Madrid y Valencia) en tres meses distintos (Diciembre, Marzo y Junio).</a:t>
             </a:r>
           </a:p>
         </p:txBody>
@@ -26907,8 +26883,8 @@
         </p:nvSpPr>
         <p:spPr>
           <a:xfrm>
-            <a:off x="254190" y="1146074"/>
-            <a:ext cx="6715087" cy="4989186"/>
+            <a:off x="128966" y="1417183"/>
+            <a:ext cx="6715087" cy="4116768"/>
           </a:xfrm>
           <a:prstGeom prst="rect">
             <a:avLst/>
@@ -27003,41 +26979,6 @@
                 </a:solidFill>
                 <a:sym typeface="Wingdings" panose="05000000000000000000" pitchFamily="2" charset="2"/>
               </a:rPr>
-              <a:t>Eliminación de columnas con información redundante (Por. </a:t>
-            </a:r>
-            <a:r>
-              <a:rPr lang="es-ES" sz="1600" dirty="0" err="1">
-                <a:solidFill>
-                  <a:srgbClr val="002060"/>
-                </a:solidFill>
-                <a:sym typeface="Wingdings" panose="05000000000000000000" pitchFamily="2" charset="2"/>
-              </a:rPr>
-              <a:t>Ej</a:t>
-            </a:r>
-            <a:r>
-              <a:rPr lang="es-ES" sz="1600" dirty="0">
-                <a:solidFill>
-                  <a:srgbClr val="002060"/>
-                </a:solidFill>
-                <a:sym typeface="Wingdings" panose="05000000000000000000" pitchFamily="2" charset="2"/>
-              </a:rPr>
-              <a:t>: el nombre del alojamiento).</a:t>
-            </a:r>
-          </a:p>
-          <a:p>
-            <a:pPr marL="342900" indent="-342900" algn="just">
-              <a:lnSpc>
-                <a:spcPct val="150000"/>
-              </a:lnSpc>
-              <a:buAutoNum type="arabicPeriod"/>
-            </a:pPr>
-            <a:r>
-              <a:rPr lang="es-ES" sz="1600" dirty="0">
-                <a:solidFill>
-                  <a:srgbClr val="002060"/>
-                </a:solidFill>
-                <a:sym typeface="Wingdings" panose="05000000000000000000" pitchFamily="2" charset="2"/>
-              </a:rPr>
               <a:t>Split de </a:t>
             </a:r>
             <a:r>
@@ -27056,7 +26997,7 @@
                 </a:solidFill>
                 <a:sym typeface="Wingdings" panose="05000000000000000000" pitchFamily="2" charset="2"/>
               </a:rPr>
-              <a:t> en función de un separador completo para generar 2 o más columnas nuevas.</a:t>
+              <a:t> en función de un separador para generar 2 o más columnas nuevas.</a:t>
             </a:r>
           </a:p>
           <a:p>
@@ -27388,8 +27329,8 @@
         </p:nvSpPr>
         <p:spPr>
           <a:xfrm>
-            <a:off x="440456" y="1080079"/>
-            <a:ext cx="6816687" cy="5732595"/>
+            <a:off x="440456" y="1543740"/>
+            <a:ext cx="6816687" cy="3770519"/>
           </a:xfrm>
           <a:prstGeom prst="rect">
             <a:avLst/>
@@ -27480,8 +27421,23 @@
                 </a:solidFill>
                 <a:sym typeface="Wingdings" panose="05000000000000000000" pitchFamily="2" charset="2"/>
               </a:rPr>
-              <a:t> en la mayoría del resto de columnas, por lo que en estos casos se ha optado por eliminar dichas filas.</a:t>
+              <a:t> en la mayoría del resto de columnas  </a:t>
             </a:r>
+            <a:r>
+              <a:rPr lang="es-ES" sz="1600" b="1" dirty="0">
+                <a:solidFill>
+                  <a:srgbClr val="002060"/>
+                </a:solidFill>
+                <a:sym typeface="Wingdings" panose="05000000000000000000" pitchFamily="2" charset="2"/>
+              </a:rPr>
+              <a:t>Eliminación de registros.</a:t>
+            </a:r>
+            <a:endParaRPr lang="es-ES" sz="1600" dirty="0">
+              <a:solidFill>
+                <a:srgbClr val="002060"/>
+              </a:solidFill>
+              <a:sym typeface="Wingdings" panose="05000000000000000000" pitchFamily="2" charset="2"/>
+            </a:endParaRPr>
           </a:p>
           <a:p>
             <a:pPr marL="342900" indent="-342900" algn="just">
@@ -27552,7 +27508,61 @@
                 </a:solidFill>
                 <a:sym typeface="Wingdings" panose="05000000000000000000" pitchFamily="2" charset="2"/>
               </a:rPr>
-              <a:t> etc.) no presentan la misma problemática que las anteriores, por lo que en estos casos se ha preferido mantener los registros y llevar a cabo una imputación mediante el algoritmo de K Vecinos más Próximos (o KNN).</a:t>
+              <a:t> etc.) no presentan la misma problemática que las anteriores  </a:t>
+            </a:r>
+            <a:r>
+              <a:rPr lang="es-ES" sz="1600" b="1" dirty="0">
+                <a:solidFill>
+                  <a:srgbClr val="002060"/>
+                </a:solidFill>
+                <a:sym typeface="Wingdings" panose="05000000000000000000" pitchFamily="2" charset="2"/>
+              </a:rPr>
+              <a:t>Mantener registros e </a:t>
+            </a:r>
+            <a:r>
+              <a:rPr lang="es-ES" sz="1600" b="1" dirty="0" err="1">
+                <a:solidFill>
+                  <a:srgbClr val="002060"/>
+                </a:solidFill>
+                <a:sym typeface="Wingdings" panose="05000000000000000000" pitchFamily="2" charset="2"/>
+              </a:rPr>
+              <a:t>inputar</a:t>
+            </a:r>
+            <a:r>
+              <a:rPr lang="es-ES" sz="1600" b="1" dirty="0">
+                <a:solidFill>
+                  <a:srgbClr val="002060"/>
+                </a:solidFill>
+                <a:sym typeface="Wingdings" panose="05000000000000000000" pitchFamily="2" charset="2"/>
+              </a:rPr>
+              <a:t> con </a:t>
+            </a:r>
+            <a:r>
+              <a:rPr lang="es-ES" sz="1600" dirty="0">
+                <a:solidFill>
+                  <a:srgbClr val="002060"/>
+                </a:solidFill>
+                <a:sym typeface="Wingdings" panose="05000000000000000000" pitchFamily="2" charset="2"/>
+              </a:rPr>
+              <a:t> </a:t>
+            </a:r>
+            <a:r>
+              <a:rPr lang="es-ES" sz="1600" b="1" dirty="0">
+                <a:solidFill>
+                  <a:srgbClr val="002060"/>
+                </a:solidFill>
+                <a:sym typeface="Wingdings" panose="05000000000000000000" pitchFamily="2" charset="2"/>
+              </a:rPr>
+              <a:t>KNN</a:t>
+            </a:r>
+            <a:r>
+              <a:rPr lang="es-ES" sz="1600" dirty="0">
+                <a:solidFill>
+                  <a:srgbClr val="002060"/>
+                </a:solidFill>
+                <a:sym typeface="Wingdings" panose="05000000000000000000" pitchFamily="2" charset="2"/>
+              </a:rPr>
+              <a:t>.</a:t>
             </a:r>
           </a:p>
           <a:p>
@@ -27570,7 +27580,7 @@
                 </a:solidFill>
                 <a:sym typeface="Wingdings" panose="05000000000000000000" pitchFamily="2" charset="2"/>
               </a:rPr>
-              <a:t>Cabe destacar el caso de </a:t>
+              <a:t>Caso especial con </a:t>
             </a:r>
             <a:r>
               <a:rPr lang="es-ES" sz="1600" dirty="0" err="1">
@@ -27588,43 +27598,7 @@
                 </a:solidFill>
                 <a:sym typeface="Wingdings" panose="05000000000000000000" pitchFamily="2" charset="2"/>
               </a:rPr>
-              <a:t>, en el que encontramos valores faltantes tanto como </a:t>
-            </a:r>
-            <a:r>
-              <a:rPr lang="es-ES" sz="1600" dirty="0" err="1">
-                <a:solidFill>
-                  <a:srgbClr val="002060"/>
-                </a:solidFill>
-                <a:sym typeface="Wingdings" panose="05000000000000000000" pitchFamily="2" charset="2"/>
-              </a:rPr>
-              <a:t>NAs</a:t>
-            </a:r>
-            <a:r>
-              <a:rPr lang="es-ES" sz="1600" dirty="0">
-                <a:solidFill>
-                  <a:srgbClr val="002060"/>
-                </a:solidFill>
-                <a:sym typeface="Wingdings" panose="05000000000000000000" pitchFamily="2" charset="2"/>
-              </a:rPr>
-              <a:t> (por un fallo del web </a:t>
-            </a:r>
-            <a:r>
-              <a:rPr lang="es-ES" sz="1600" dirty="0" err="1">
-                <a:solidFill>
-                  <a:srgbClr val="002060"/>
-                </a:solidFill>
-                <a:sym typeface="Wingdings" panose="05000000000000000000" pitchFamily="2" charset="2"/>
-              </a:rPr>
-              <a:t>scraper</a:t>
-            </a:r>
-            <a:r>
-              <a:rPr lang="es-ES" sz="1600" dirty="0">
-                <a:solidFill>
-                  <a:srgbClr val="002060"/>
-                </a:solidFill>
-                <a:sym typeface="Wingdings" panose="05000000000000000000" pitchFamily="2" charset="2"/>
-              </a:rPr>
-              <a:t>) como con valor “-1” (debido a que el hotel no presentaba estos valores). </a:t>
+              <a:t>  </a:t>
             </a:r>
             <a:r>
               <a:rPr lang="es-ES" sz="1600" b="1" dirty="0">
@@ -27873,7 +27847,7 @@
         <p:spPr>
           <a:xfrm>
             <a:off x="440456" y="1088573"/>
-            <a:ext cx="10864282" cy="2126864"/>
+            <a:ext cx="10864282" cy="1711366"/>
           </a:xfrm>
           <a:prstGeom prst="rect">
             <a:avLst/>
@@ -27897,7 +27871,7 @@
                   <a:srgbClr val="002060"/>
                 </a:solidFill>
               </a:rPr>
-              <a:t>Los valores extremos se han intentado detectar visualmente mediante el uso de box-</a:t>
+              <a:t>Uso de box-</a:t>
             </a:r>
             <a:r>
               <a:rPr lang="es-ES" dirty="0" err="1">
@@ -27913,7 +27887,7 @@
                   <a:srgbClr val="002060"/>
                 </a:solidFill>
               </a:rPr>
-              <a:t> y por otro lado se ha hecho uso de la función “</a:t>
+              <a:t> para detección visual y uso de la función “</a:t>
             </a:r>
             <a:r>
               <a:rPr lang="es-ES" dirty="0" err="1">
@@ -27945,40 +27919,20 @@
                   <a:srgbClr val="002060"/>
                 </a:solidFill>
               </a:rPr>
-              <a:t> si nos basamos en los </a:t>
+              <a:t>. </a:t>
             </a:r>
-            <a:r>
-              <a:rPr lang="es-ES" dirty="0" err="1">
-                <a:solidFill>
-                  <a:srgbClr val="002060"/>
-                </a:solidFill>
-              </a:rPr>
-              <a:t>boxplots</a:t>
-            </a:r>
-            <a:r>
-              <a:rPr lang="es-ES" dirty="0">
-                <a:solidFill>
-                  <a:srgbClr val="002060"/>
-                </a:solidFill>
-              </a:rPr>
-              <a:t>. En este caso, consideramos </a:t>
-            </a:r>
-            <a:r>
-              <a:rPr lang="es-ES" dirty="0" err="1">
-                <a:solidFill>
-                  <a:srgbClr val="002060"/>
-                </a:solidFill>
-              </a:rPr>
-              <a:t>outliers</a:t>
-            </a:r>
-            <a:r>
-              <a:rPr lang="es-ES" dirty="0">
-                <a:solidFill>
-                  <a:srgbClr val="002060"/>
-                </a:solidFill>
-              </a:rPr>
-              <a:t> a aquellos puntos que se sitúan más allá de 1.5 veces el índice intercuartílico con respecto a la mediana. </a:t>
-            </a:r>
+            <a:endParaRPr lang="es-ES" b="1" dirty="0">
+              <a:solidFill>
+                <a:srgbClr val="002060"/>
+              </a:solidFill>
+            </a:endParaRPr>
+          </a:p>
+          <a:p>
+            <a:pPr algn="just">
+              <a:lnSpc>
+                <a:spcPct val="150000"/>
+              </a:lnSpc>
+            </a:pPr>
             <a:r>
               <a:rPr lang="es-ES" b="1" dirty="0">
                 <a:solidFill>
@@ -28037,8 +27991,8 @@
         </p:blipFill>
         <p:spPr bwMode="auto">
           <a:xfrm>
-            <a:off x="5491143" y="3528689"/>
-            <a:ext cx="6260401" cy="2653036"/>
+            <a:off x="5491143" y="2913813"/>
+            <a:ext cx="6260401" cy="3267912"/>
           </a:xfrm>
           <a:prstGeom prst="rect">
             <a:avLst/>
@@ -28075,8 +28029,8 @@
         </p:blipFill>
         <p:spPr>
           <a:xfrm>
-            <a:off x="440456" y="3429000"/>
-            <a:ext cx="4782684" cy="2752725"/>
+            <a:off x="440456" y="3120572"/>
+            <a:ext cx="4782684" cy="3061154"/>
           </a:xfrm>
           <a:prstGeom prst="rect">
             <a:avLst/>
@@ -28239,7 +28193,7 @@
         <p:spPr>
           <a:xfrm>
             <a:off x="440456" y="1235188"/>
-            <a:ext cx="10779087" cy="3615733"/>
+            <a:ext cx="10779087" cy="3200235"/>
           </a:xfrm>
           <a:prstGeom prst="rect">
             <a:avLst/>
@@ -28306,7 +28260,7 @@
                   <a:srgbClr val="002060"/>
                 </a:solidFill>
               </a:rPr>
-              <a:t>Como parte de integración hemos decidido introducir datos sobre el número de vuelos medio por mes (datos extraídos de Eurostat) por distintas razones:</a:t>
+              <a:t>Introducción de datos sobre el número de vuelos medio por mes por distintas razones:</a:t>
             </a:r>
           </a:p>
           <a:p>

</xml_diff>